<commit_message>
Applied a design template and made small changes
</commit_message>
<xml_diff>
--- a/Presentation1.pptx
+++ b/Presentation1.pptx
@@ -2,7 +2,7 @@
 <file path=ppt/presentation.xml><?xml version="1.0" encoding="utf-8"?>
 <p:presentation xmlns:a="http://schemas.openxmlformats.org/drawingml/2006/main" xmlns:r="http://schemas.openxmlformats.org/officeDocument/2006/relationships" xmlns:p="http://schemas.openxmlformats.org/presentationml/2006/main" saveSubsetFonts="1" autoCompressPictures="0">
   <p:sldMasterIdLst>
-    <p:sldMasterId id="2147483648" r:id="rId1"/>
+    <p:sldMasterId id="2147483696" r:id="rId1"/>
   </p:sldMasterIdLst>
   <p:notesMasterIdLst>
     <p:notesMasterId r:id="rId14"/>
@@ -225,7 +225,7 @@
           <a:p>
             <a:fld id="{0F8BB444-EF59-AF47-AE8C-C0DA026BC7F8}" type="datetimeFigureOut">
               <a:rPr lang="en-US" smtClean="0"/>
-              <a:t>4/21/14</a:t>
+              <a:t>4/21/2014</a:t>
             </a:fld>
             <a:endParaRPr lang="en-US"/>
           </a:p>
@@ -586,7 +586,7 @@
 </file>
 
 <file path=ppt/slideLayouts/slideLayout1.xml><?xml version="1.0" encoding="utf-8"?>
-<p:sldLayout xmlns:a="http://schemas.openxmlformats.org/drawingml/2006/main" xmlns:r="http://schemas.openxmlformats.org/officeDocument/2006/relationships" xmlns:p="http://schemas.openxmlformats.org/presentationml/2006/main" type="title" preserve="1">
+<p:sldLayout xmlns:a="http://schemas.openxmlformats.org/drawingml/2006/main" xmlns:r="http://schemas.openxmlformats.org/officeDocument/2006/relationships" xmlns:p="http://schemas.openxmlformats.org/presentationml/2006/main" showMasterSp="0" type="title" preserve="1">
   <p:cSld name="Title Slide">
     <p:spTree>
       <p:nvGrpSpPr>
@@ -604,29 +604,78 @@
       </p:grpSpPr>
       <p:sp>
         <p:nvSpPr>
-          <p:cNvPr id="2" name="Title 1"/>
-          <p:cNvSpPr>
-            <a:spLocks noGrp="1"/>
-          </p:cNvSpPr>
-          <p:nvPr>
-            <p:ph type="ctrTitle"/>
-          </p:nvPr>
+          <p:cNvPr id="8" name="Rectangle 7"/>
+          <p:cNvSpPr/>
+          <p:nvPr/>
         </p:nvSpPr>
         <p:spPr>
           <a:xfrm>
-            <a:off x="685800" y="2130425"/>
-            <a:ext cx="7772400" cy="1470025"/>
+            <a:off x="777240" y="0"/>
+            <a:ext cx="7543800" cy="3048000"/>
+          </a:xfrm>
+          <a:prstGeom prst="rect">
+            <a:avLst/>
+          </a:prstGeom>
+          <a:ln>
+            <a:noFill/>
+          </a:ln>
+        </p:spPr>
+        <p:style>
+          <a:lnRef idx="2">
+            <a:schemeClr val="accent1">
+              <a:shade val="50000"/>
+            </a:schemeClr>
+          </a:lnRef>
+          <a:fillRef idx="1">
+            <a:schemeClr val="accent1"/>
+          </a:fillRef>
+          <a:effectRef idx="0">
+            <a:schemeClr val="accent1"/>
+          </a:effectRef>
+          <a:fontRef idx="minor">
+            <a:schemeClr val="lt1"/>
+          </a:fontRef>
+        </p:style>
+        <p:txBody>
+          <a:bodyPr rtlCol="0" anchor="ctr"/>
+          <a:lstStyle/>
+          <a:p>
+            <a:pPr algn="ctr"/>
+            <a:endParaRPr lang="en-US"/>
+          </a:p>
+        </p:txBody>
+      </p:sp>
+      <p:sp>
+        <p:nvSpPr>
+          <p:cNvPr id="2" name="Title 1"/>
+          <p:cNvSpPr>
+            <a:spLocks noGrp="1"/>
+          </p:cNvSpPr>
+          <p:nvPr>
+            <p:ph type="ctrTitle"/>
+          </p:nvPr>
+        </p:nvSpPr>
+        <p:spPr>
+          <a:xfrm>
+            <a:off x="762000" y="3200400"/>
+            <a:ext cx="7543800" cy="1524000"/>
           </a:xfrm>
         </p:spPr>
         <p:txBody>
-          <a:bodyPr/>
-          <a:lstStyle/>
+          <a:bodyPr>
+            <a:noAutofit/>
+          </a:bodyPr>
+          <a:lstStyle>
+            <a:lvl1pPr>
+              <a:defRPr sz="8000"/>
+            </a:lvl1pPr>
+          </a:lstStyle>
           <a:p>
             <a:r>
               <a:rPr lang="en-US" smtClean="0"/>
               <a:t>Click to edit Master title style</a:t>
             </a:r>
-            <a:endParaRPr lang="en-US"/>
+            <a:endParaRPr lang="en-US" dirty="0"/>
           </a:p>
         </p:txBody>
       </p:sp>
@@ -642,20 +691,20 @@
         </p:nvSpPr>
         <p:spPr>
           <a:xfrm>
-            <a:off x="1371600" y="3886200"/>
-            <a:ext cx="6400800" cy="1752600"/>
+            <a:off x="762000" y="4724400"/>
+            <a:ext cx="6858000" cy="990600"/>
           </a:xfrm>
         </p:spPr>
         <p:txBody>
-          <a:bodyPr/>
+          <a:bodyPr anchor="t" anchorCtr="0">
+            <a:normAutofit/>
+          </a:bodyPr>
           <a:lstStyle>
-            <a:lvl1pPr marL="0" indent="0" algn="ctr">
-              <a:buNone/>
-              <a:defRPr>
+            <a:lvl1pPr marL="0" indent="0" algn="l">
+              <a:buNone/>
+              <a:defRPr sz="2800">
                 <a:solidFill>
-                  <a:schemeClr val="tx1">
-                    <a:tint val="75000"/>
-                  </a:schemeClr>
+                  <a:schemeClr val="tx2"/>
                 </a:solidFill>
               </a:defRPr>
             </a:lvl1pPr>
@@ -745,7 +794,7 @@
               <a:rPr lang="en-US" smtClean="0"/>
               <a:t>Click to edit Master subtitle style</a:t>
             </a:r>
-            <a:endParaRPr lang="en-US"/>
+            <a:endParaRPr lang="en-US" dirty="0"/>
           </a:p>
         </p:txBody>
       </p:sp>
@@ -766,7 +815,7 @@
           <a:p>
             <a:fld id="{4AD26688-83F8-AC4D-BBFC-F74327B9A175}" type="datetimeFigureOut">
               <a:rPr lang="en-US" smtClean="0"/>
-              <a:t>4/21/14</a:t>
+              <a:t>4/21/2014</a:t>
             </a:fld>
             <a:endParaRPr lang="en-US"/>
           </a:p>
@@ -814,16 +863,61 @@
           </a:p>
         </p:txBody>
       </p:sp>
+      <p:sp>
+        <p:nvSpPr>
+          <p:cNvPr id="7" name="Rectangle 6"/>
+          <p:cNvSpPr/>
+          <p:nvPr/>
+        </p:nvSpPr>
+        <p:spPr>
+          <a:xfrm>
+            <a:off x="777240" y="6172200"/>
+            <a:ext cx="7543800" cy="27432"/>
+          </a:xfrm>
+          <a:prstGeom prst="rect">
+            <a:avLst/>
+          </a:prstGeom>
+          <a:ln>
+            <a:noFill/>
+          </a:ln>
+        </p:spPr>
+        <p:style>
+          <a:lnRef idx="2">
+            <a:schemeClr val="accent1">
+              <a:shade val="50000"/>
+            </a:schemeClr>
+          </a:lnRef>
+          <a:fillRef idx="1">
+            <a:schemeClr val="accent1"/>
+          </a:fillRef>
+          <a:effectRef idx="0">
+            <a:schemeClr val="accent1"/>
+          </a:effectRef>
+          <a:fontRef idx="minor">
+            <a:schemeClr val="lt1"/>
+          </a:fontRef>
+        </p:style>
+        <p:txBody>
+          <a:bodyPr rtlCol="0" anchor="ctr"/>
+          <a:lstStyle/>
+          <a:p>
+            <a:pPr algn="ctr"/>
+            <a:endParaRPr lang="en-US"/>
+          </a:p>
+        </p:txBody>
+      </p:sp>
     </p:spTree>
-    <p:extLst>
-      <p:ext uri="{BB962C8B-B14F-4D97-AF65-F5344CB8AC3E}">
-        <p14:creationId xmlns:p14="http://schemas.microsoft.com/office/powerpoint/2010/main" val="1595727190"/>
-      </p:ext>
-    </p:extLst>
   </p:cSld>
   <p:clrMapOvr>
     <a:masterClrMapping/>
   </p:clrMapOvr>
+  <p:timing>
+    <p:tnLst>
+      <p:par>
+        <p:cTn id="1" dur="indefinite" restart="never" nodeType="tmRoot"/>
+      </p:par>
+    </p:tnLst>
+  </p:timing>
 </p:sldLayout>
 </file>
 
@@ -863,80 +957,85 @@
               <a:rPr lang="en-US" smtClean="0"/>
               <a:t>Click to edit Master title style</a:t>
             </a:r>
+            <a:endParaRPr lang="en-US" dirty="0"/>
+          </a:p>
+        </p:txBody>
+      </p:sp>
+      <p:sp>
+        <p:nvSpPr>
+          <p:cNvPr id="3" name="Vertical Text Placeholder 2"/>
+          <p:cNvSpPr>
+            <a:spLocks noGrp="1"/>
+          </p:cNvSpPr>
+          <p:nvPr>
+            <p:ph type="body" orient="vert" idx="1"/>
+          </p:nvPr>
+        </p:nvSpPr>
+        <p:spPr>
+          <a:xfrm>
+            <a:off x="914400" y="685800"/>
+            <a:ext cx="7239000" cy="3886200"/>
+          </a:xfrm>
+        </p:spPr>
+        <p:txBody>
+          <a:bodyPr vert="eaVert" anchor="t" anchorCtr="0"/>
+          <a:lstStyle/>
+          <a:p>
+            <a:pPr lvl="0"/>
+            <a:r>
+              <a:rPr lang="en-US" smtClean="0"/>
+              <a:t>Click to edit Master text styles</a:t>
+            </a:r>
+          </a:p>
+          <a:p>
+            <a:pPr lvl="1"/>
+            <a:r>
+              <a:rPr lang="en-US" smtClean="0"/>
+              <a:t>Second level</a:t>
+            </a:r>
+          </a:p>
+          <a:p>
+            <a:pPr lvl="2"/>
+            <a:r>
+              <a:rPr lang="en-US" smtClean="0"/>
+              <a:t>Third level</a:t>
+            </a:r>
+          </a:p>
+          <a:p>
+            <a:pPr lvl="3"/>
+            <a:r>
+              <a:rPr lang="en-US" smtClean="0"/>
+              <a:t>Fourth level</a:t>
+            </a:r>
+          </a:p>
+          <a:p>
+            <a:pPr lvl="4"/>
+            <a:r>
+              <a:rPr lang="en-US" smtClean="0"/>
+              <a:t>Fifth level</a:t>
+            </a:r>
             <a:endParaRPr lang="en-US"/>
           </a:p>
         </p:txBody>
       </p:sp>
       <p:sp>
         <p:nvSpPr>
-          <p:cNvPr id="3" name="Vertical Text Placeholder 2"/>
-          <p:cNvSpPr>
-            <a:spLocks noGrp="1"/>
-          </p:cNvSpPr>
-          <p:nvPr>
-            <p:ph type="body" orient="vert" idx="1"/>
+          <p:cNvPr id="4" name="Date Placeholder 3"/>
+          <p:cNvSpPr>
+            <a:spLocks noGrp="1"/>
+          </p:cNvSpPr>
+          <p:nvPr>
+            <p:ph type="dt" sz="half" idx="10"/>
           </p:nvPr>
         </p:nvSpPr>
         <p:spPr/>
         <p:txBody>
-          <a:bodyPr vert="eaVert"/>
-          <a:lstStyle/>
-          <a:p>
-            <a:pPr lvl="0"/>
-            <a:r>
-              <a:rPr lang="en-US" smtClean="0"/>
-              <a:t>Click to edit Master text styles</a:t>
-            </a:r>
-          </a:p>
-          <a:p>
-            <a:pPr lvl="1"/>
-            <a:r>
-              <a:rPr lang="en-US" smtClean="0"/>
-              <a:t>Second level</a:t>
-            </a:r>
-          </a:p>
-          <a:p>
-            <a:pPr lvl="2"/>
-            <a:r>
-              <a:rPr lang="en-US" smtClean="0"/>
-              <a:t>Third level</a:t>
-            </a:r>
-          </a:p>
-          <a:p>
-            <a:pPr lvl="3"/>
-            <a:r>
-              <a:rPr lang="en-US" smtClean="0"/>
-              <a:t>Fourth level</a:t>
-            </a:r>
-          </a:p>
-          <a:p>
-            <a:pPr lvl="4"/>
-            <a:r>
-              <a:rPr lang="en-US" smtClean="0"/>
-              <a:t>Fifth level</a:t>
-            </a:r>
-            <a:endParaRPr lang="en-US"/>
-          </a:p>
-        </p:txBody>
-      </p:sp>
-      <p:sp>
-        <p:nvSpPr>
-          <p:cNvPr id="4" name="Date Placeholder 3"/>
-          <p:cNvSpPr>
-            <a:spLocks noGrp="1"/>
-          </p:cNvSpPr>
-          <p:nvPr>
-            <p:ph type="dt" sz="half" idx="10"/>
-          </p:nvPr>
-        </p:nvSpPr>
-        <p:spPr/>
-        <p:txBody>
           <a:bodyPr/>
           <a:lstStyle/>
           <a:p>
             <a:fld id="{4AD26688-83F8-AC4D-BBFC-F74327B9A175}" type="datetimeFigureOut">
               <a:rPr lang="en-US" smtClean="0"/>
-              <a:t>4/21/14</a:t>
+              <a:t>4/21/2014</a:t>
             </a:fld>
             <a:endParaRPr lang="en-US"/>
           </a:p>
@@ -985,15 +1084,17 @@
         </p:txBody>
       </p:sp>
     </p:spTree>
-    <p:extLst>
-      <p:ext uri="{BB962C8B-B14F-4D97-AF65-F5344CB8AC3E}">
-        <p14:creationId xmlns:p14="http://schemas.microsoft.com/office/powerpoint/2010/main" val="2902510592"/>
-      </p:ext>
-    </p:extLst>
   </p:cSld>
   <p:clrMapOvr>
     <a:masterClrMapping/>
   </p:clrMapOvr>
+  <p:timing>
+    <p:tnLst>
+      <p:par>
+        <p:cTn id="1" dur="indefinite" restart="never" nodeType="tmRoot"/>
+      </p:par>
+    </p:tnLst>
+  </p:timing>
 </p:sldLayout>
 </file>
 
@@ -1026,8 +1127,8 @@
         </p:nvSpPr>
         <p:spPr>
           <a:xfrm>
-            <a:off x="6629400" y="274638"/>
-            <a:ext cx="2057400" cy="5851525"/>
+            <a:off x="762000" y="685801"/>
+            <a:ext cx="1828800" cy="5410199"/>
           </a:xfrm>
         </p:spPr>
         <p:txBody>
@@ -1038,7 +1139,7 @@
               <a:rPr lang="en-US" smtClean="0"/>
               <a:t>Click to edit Master title style</a:t>
             </a:r>
-            <a:endParaRPr lang="en-US"/>
+            <a:endParaRPr lang="en-US" dirty="0"/>
           </a:p>
         </p:txBody>
       </p:sp>
@@ -1054,12 +1155,12 @@
         </p:nvSpPr>
         <p:spPr>
           <a:xfrm>
-            <a:off x="457200" y="274638"/>
-            <a:ext cx="6019800" cy="5851525"/>
+            <a:off x="2590800" y="685801"/>
+            <a:ext cx="5715000" cy="4876800"/>
           </a:xfrm>
         </p:spPr>
         <p:txBody>
-          <a:bodyPr vert="eaVert"/>
+          <a:bodyPr vert="eaVert" anchor="t" anchorCtr="0"/>
           <a:lstStyle/>
           <a:p>
             <a:pPr lvl="0"/>
@@ -1116,7 +1217,7 @@
           <a:p>
             <a:fld id="{4AD26688-83F8-AC4D-BBFC-F74327B9A175}" type="datetimeFigureOut">
               <a:rPr lang="en-US" smtClean="0"/>
-              <a:t>4/21/14</a:t>
+              <a:t>4/21/2014</a:t>
             </a:fld>
             <a:endParaRPr lang="en-US"/>
           </a:p>
@@ -1165,15 +1266,17 @@
         </p:txBody>
       </p:sp>
     </p:spTree>
-    <p:extLst>
-      <p:ext uri="{BB962C8B-B14F-4D97-AF65-F5344CB8AC3E}">
-        <p14:creationId xmlns:p14="http://schemas.microsoft.com/office/powerpoint/2010/main" val="2629980144"/>
-      </p:ext>
-    </p:extLst>
   </p:cSld>
   <p:clrMapOvr>
     <a:masterClrMapping/>
   </p:clrMapOvr>
+  <p:timing>
+    <p:tnLst>
+      <p:par>
+        <p:cTn id="1" dur="indefinite" restart="never" nodeType="tmRoot"/>
+      </p:par>
+    </p:tnLst>
+  </p:timing>
 </p:sldLayout>
 </file>
 
@@ -1286,7 +1389,7 @@
           <a:p>
             <a:fld id="{4AD26688-83F8-AC4D-BBFC-F74327B9A175}" type="datetimeFigureOut">
               <a:rPr lang="en-US" smtClean="0"/>
-              <a:t>4/21/14</a:t>
+              <a:t>4/21/2014</a:t>
             </a:fld>
             <a:endParaRPr lang="en-US"/>
           </a:p>
@@ -1335,20 +1438,22 @@
         </p:txBody>
       </p:sp>
     </p:spTree>
-    <p:extLst>
-      <p:ext uri="{BB962C8B-B14F-4D97-AF65-F5344CB8AC3E}">
-        <p14:creationId xmlns:p14="http://schemas.microsoft.com/office/powerpoint/2010/main" val="251639407"/>
-      </p:ext>
-    </p:extLst>
   </p:cSld>
   <p:clrMapOvr>
     <a:masterClrMapping/>
   </p:clrMapOvr>
+  <p:timing>
+    <p:tnLst>
+      <p:par>
+        <p:cTn id="1" dur="indefinite" restart="never" nodeType="tmRoot"/>
+      </p:par>
+    </p:tnLst>
+  </p:timing>
 </p:sldLayout>
 </file>
 
 <file path=ppt/slideLayouts/slideLayout3.xml><?xml version="1.0" encoding="utf-8"?>
-<p:sldLayout xmlns:a="http://schemas.openxmlformats.org/drawingml/2006/main" xmlns:r="http://schemas.openxmlformats.org/officeDocument/2006/relationships" xmlns:p="http://schemas.openxmlformats.org/presentationml/2006/main" type="secHead" preserve="1">
+<p:sldLayout xmlns:a="http://schemas.openxmlformats.org/drawingml/2006/main" xmlns:r="http://schemas.openxmlformats.org/officeDocument/2006/relationships" xmlns:p="http://schemas.openxmlformats.org/presentationml/2006/main" showMasterSp="0" type="secHead" preserve="1">
   <p:cSld name="Section Header">
     <p:spTree>
       <p:nvGrpSpPr>
@@ -1366,25 +1471,68 @@
       </p:grpSpPr>
       <p:sp>
         <p:nvSpPr>
-          <p:cNvPr id="2" name="Title 1"/>
-          <p:cNvSpPr>
-            <a:spLocks noGrp="1"/>
-          </p:cNvSpPr>
-          <p:nvPr>
-            <p:ph type="title"/>
-          </p:nvPr>
+          <p:cNvPr id="7" name="Rectangle 6"/>
+          <p:cNvSpPr/>
+          <p:nvPr/>
         </p:nvSpPr>
         <p:spPr>
           <a:xfrm>
-            <a:off x="722313" y="4406900"/>
-            <a:ext cx="7772400" cy="1362075"/>
+            <a:off x="777240" y="0"/>
+            <a:ext cx="7543800" cy="3048000"/>
+          </a:xfrm>
+          <a:prstGeom prst="rect">
+            <a:avLst/>
+          </a:prstGeom>
+          <a:ln>
+            <a:noFill/>
+          </a:ln>
+        </p:spPr>
+        <p:style>
+          <a:lnRef idx="2">
+            <a:schemeClr val="accent1">
+              <a:shade val="50000"/>
+            </a:schemeClr>
+          </a:lnRef>
+          <a:fillRef idx="1">
+            <a:schemeClr val="accent1"/>
+          </a:fillRef>
+          <a:effectRef idx="0">
+            <a:schemeClr val="accent1"/>
+          </a:effectRef>
+          <a:fontRef idx="minor">
+            <a:schemeClr val="lt1"/>
+          </a:fontRef>
+        </p:style>
+        <p:txBody>
+          <a:bodyPr rtlCol="0" anchor="ctr"/>
+          <a:lstStyle/>
+          <a:p>
+            <a:pPr algn="ctr"/>
+            <a:endParaRPr lang="en-US"/>
+          </a:p>
+        </p:txBody>
+      </p:sp>
+      <p:sp>
+        <p:nvSpPr>
+          <p:cNvPr id="2" name="Title 1"/>
+          <p:cNvSpPr>
+            <a:spLocks noGrp="1"/>
+          </p:cNvSpPr>
+          <p:nvPr>
+            <p:ph type="title"/>
+          </p:nvPr>
+        </p:nvSpPr>
+        <p:spPr>
+          <a:xfrm>
+            <a:off x="762000" y="3276600"/>
+            <a:ext cx="7543800" cy="1676400"/>
           </a:xfrm>
         </p:spPr>
         <p:txBody>
-          <a:bodyPr anchor="t"/>
+          <a:bodyPr anchor="b" anchorCtr="0"/>
           <a:lstStyle>
             <a:lvl1pPr algn="l">
-              <a:defRPr sz="4000" b="1" cap="all"/>
+              <a:defRPr sz="5400" b="0" cap="all"/>
             </a:lvl1pPr>
           </a:lstStyle>
           <a:p>
@@ -1392,7 +1540,7 @@
               <a:rPr lang="en-US" smtClean="0"/>
               <a:t>Click to edit Master title style</a:t>
             </a:r>
-            <a:endParaRPr lang="en-US"/>
+            <a:endParaRPr lang="en-US" dirty="0"/>
           </a:p>
         </p:txBody>
       </p:sp>
@@ -1408,20 +1556,20 @@
         </p:nvSpPr>
         <p:spPr>
           <a:xfrm>
-            <a:off x="722313" y="2906713"/>
-            <a:ext cx="7772400" cy="1500187"/>
+            <a:off x="762000" y="4953000"/>
+            <a:ext cx="6858000" cy="914400"/>
           </a:xfrm>
         </p:spPr>
         <p:txBody>
-          <a:bodyPr anchor="b"/>
+          <a:bodyPr anchor="t" anchorCtr="0">
+            <a:normAutofit/>
+          </a:bodyPr>
           <a:lstStyle>
             <a:lvl1pPr marL="0" indent="0">
               <a:buNone/>
-              <a:defRPr sz="2000">
+              <a:defRPr sz="2800">
                 <a:solidFill>
-                  <a:schemeClr val="tx1">
-                    <a:tint val="75000"/>
-                  </a:schemeClr>
+                  <a:schemeClr val="tx2"/>
                 </a:solidFill>
               </a:defRPr>
             </a:lvl1pPr>
@@ -1532,7 +1680,7 @@
           <a:p>
             <a:fld id="{4AD26688-83F8-AC4D-BBFC-F74327B9A175}" type="datetimeFigureOut">
               <a:rPr lang="en-US" smtClean="0"/>
-              <a:t>4/21/14</a:t>
+              <a:t>4/21/2014</a:t>
             </a:fld>
             <a:endParaRPr lang="en-US"/>
           </a:p>
@@ -1580,16 +1728,61 @@
           </a:p>
         </p:txBody>
       </p:sp>
+      <p:sp>
+        <p:nvSpPr>
+          <p:cNvPr id="8" name="Rectangle 7"/>
+          <p:cNvSpPr/>
+          <p:nvPr/>
+        </p:nvSpPr>
+        <p:spPr>
+          <a:xfrm>
+            <a:off x="777240" y="6172200"/>
+            <a:ext cx="7543800" cy="27432"/>
+          </a:xfrm>
+          <a:prstGeom prst="rect">
+            <a:avLst/>
+          </a:prstGeom>
+          <a:ln>
+            <a:noFill/>
+          </a:ln>
+        </p:spPr>
+        <p:style>
+          <a:lnRef idx="2">
+            <a:schemeClr val="accent1">
+              <a:shade val="50000"/>
+            </a:schemeClr>
+          </a:lnRef>
+          <a:fillRef idx="1">
+            <a:schemeClr val="accent1"/>
+          </a:fillRef>
+          <a:effectRef idx="0">
+            <a:schemeClr val="accent1"/>
+          </a:effectRef>
+          <a:fontRef idx="minor">
+            <a:schemeClr val="lt1"/>
+          </a:fontRef>
+        </p:style>
+        <p:txBody>
+          <a:bodyPr rtlCol="0" anchor="ctr"/>
+          <a:lstStyle/>
+          <a:p>
+            <a:pPr algn="ctr"/>
+            <a:endParaRPr lang="en-US"/>
+          </a:p>
+        </p:txBody>
+      </p:sp>
     </p:spTree>
-    <p:extLst>
-      <p:ext uri="{BB962C8B-B14F-4D97-AF65-F5344CB8AC3E}">
-        <p14:creationId xmlns:p14="http://schemas.microsoft.com/office/powerpoint/2010/main" val="890732538"/>
-      </p:ext>
-    </p:extLst>
   </p:cSld>
   <p:clrMapOvr>
     <a:masterClrMapping/>
   </p:clrMapOvr>
+  <p:timing>
+    <p:tnLst>
+      <p:par>
+        <p:cTn id="1" dur="indefinite" restart="never" nodeType="tmRoot"/>
+      </p:par>
+    </p:tnLst>
+  </p:timing>
 </p:sldLayout>
 </file>
 
@@ -1645,8 +1838,8 @@
         </p:nvSpPr>
         <p:spPr>
           <a:xfrm>
-            <a:off x="457200" y="1600200"/>
-            <a:ext cx="4038600" cy="4525963"/>
+            <a:off x="762000" y="609601"/>
+            <a:ext cx="3657600" cy="3767328"/>
           </a:xfrm>
         </p:spPr>
         <p:txBody>
@@ -1714,7 +1907,7 @@
               <a:rPr lang="en-US" smtClean="0"/>
               <a:t>Fifth level</a:t>
             </a:r>
-            <a:endParaRPr lang="en-US"/>
+            <a:endParaRPr lang="en-US" dirty="0"/>
           </a:p>
         </p:txBody>
       </p:sp>
@@ -1730,8 +1923,8 @@
         </p:nvSpPr>
         <p:spPr>
           <a:xfrm>
-            <a:off x="4648200" y="1600200"/>
-            <a:ext cx="4038600" cy="4525963"/>
+            <a:off x="4648200" y="609601"/>
+            <a:ext cx="3657600" cy="3767328"/>
           </a:xfrm>
         </p:spPr>
         <p:txBody>
@@ -1820,7 +2013,7 @@
           <a:p>
             <a:fld id="{4AD26688-83F8-AC4D-BBFC-F74327B9A175}" type="datetimeFigureOut">
               <a:rPr lang="en-US" smtClean="0"/>
-              <a:t>4/21/14</a:t>
+              <a:t>4/21/2014</a:t>
             </a:fld>
             <a:endParaRPr lang="en-US"/>
           </a:p>
@@ -1869,15 +2062,17 @@
         </p:txBody>
       </p:sp>
     </p:spTree>
-    <p:extLst>
-      <p:ext uri="{BB962C8B-B14F-4D97-AF65-F5344CB8AC3E}">
-        <p14:creationId xmlns:p14="http://schemas.microsoft.com/office/powerpoint/2010/main" val="4071591083"/>
-      </p:ext>
-    </p:extLst>
   </p:cSld>
   <p:clrMapOvr>
     <a:masterClrMapping/>
   </p:clrMapOvr>
+  <p:timing>
+    <p:tnLst>
+      <p:par>
+        <p:cTn id="1" dur="indefinite" restart="never" nodeType="tmRoot"/>
+      </p:par>
+    </p:tnLst>
+  </p:timing>
 </p:sldLayout>
 </file>
 
@@ -1921,7 +2116,7 @@
               <a:rPr lang="en-US" smtClean="0"/>
               <a:t>Click to edit Master title style</a:t>
             </a:r>
-            <a:endParaRPr lang="en-US"/>
+            <a:endParaRPr lang="en-US" dirty="0"/>
           </a:p>
         </p:txBody>
       </p:sp>
@@ -1937,16 +2132,20 @@
         </p:nvSpPr>
         <p:spPr>
           <a:xfrm>
-            <a:off x="457200" y="1535113"/>
-            <a:ext cx="4040188" cy="639762"/>
+            <a:off x="758952" y="609600"/>
+            <a:ext cx="3657600" cy="639762"/>
           </a:xfrm>
         </p:spPr>
         <p:txBody>
-          <a:bodyPr anchor="b"/>
+          <a:bodyPr anchor="b">
+            <a:noAutofit/>
+          </a:bodyPr>
           <a:lstStyle>
             <a:lvl1pPr marL="0" indent="0">
               <a:buNone/>
-              <a:defRPr sz="2400" b="1"/>
+              <a:defRPr sz="2800" b="0">
+                <a:latin typeface="+mj-lt"/>
+              </a:defRPr>
             </a:lvl1pPr>
             <a:lvl2pPr marL="457200" indent="0">
               <a:buNone/>
@@ -2002,12 +2201,12 @@
         </p:nvSpPr>
         <p:spPr>
           <a:xfrm>
-            <a:off x="457200" y="2174875"/>
-            <a:ext cx="4040188" cy="3951288"/>
+            <a:off x="758952" y="1329264"/>
+            <a:ext cx="3657600" cy="3048000"/>
           </a:xfrm>
         </p:spPr>
         <p:txBody>
-          <a:bodyPr/>
+          <a:bodyPr anchor="t" anchorCtr="0"/>
           <a:lstStyle>
             <a:lvl1pPr>
               <a:defRPr sz="2400"/>
@@ -2071,7 +2270,7 @@
               <a:rPr lang="en-US" smtClean="0"/>
               <a:t>Fifth level</a:t>
             </a:r>
-            <a:endParaRPr lang="en-US"/>
+            <a:endParaRPr lang="en-US" dirty="0"/>
           </a:p>
         </p:txBody>
       </p:sp>
@@ -2087,16 +2286,20 @@
         </p:nvSpPr>
         <p:spPr>
           <a:xfrm>
-            <a:off x="4645025" y="1535113"/>
-            <a:ext cx="4041775" cy="639762"/>
+            <a:off x="4645152" y="609600"/>
+            <a:ext cx="3657600" cy="639762"/>
           </a:xfrm>
         </p:spPr>
         <p:txBody>
-          <a:bodyPr anchor="b"/>
+          <a:bodyPr anchor="b">
+            <a:noAutofit/>
+          </a:bodyPr>
           <a:lstStyle>
             <a:lvl1pPr marL="0" indent="0">
               <a:buNone/>
-              <a:defRPr sz="2400" b="1"/>
+              <a:defRPr sz="2800" b="0">
+                <a:latin typeface="+mj-lt"/>
+              </a:defRPr>
             </a:lvl1pPr>
             <a:lvl2pPr marL="457200" indent="0">
               <a:buNone/>
@@ -2152,12 +2355,12 @@
         </p:nvSpPr>
         <p:spPr>
           <a:xfrm>
-            <a:off x="4645025" y="2174875"/>
-            <a:ext cx="4041775" cy="3951288"/>
+            <a:off x="4645152" y="1329264"/>
+            <a:ext cx="3657600" cy="3048000"/>
           </a:xfrm>
         </p:spPr>
         <p:txBody>
-          <a:bodyPr/>
+          <a:bodyPr anchor="t" anchorCtr="0"/>
           <a:lstStyle>
             <a:lvl1pPr>
               <a:defRPr sz="2400"/>
@@ -2242,7 +2445,7 @@
           <a:p>
             <a:fld id="{4AD26688-83F8-AC4D-BBFC-F74327B9A175}" type="datetimeFigureOut">
               <a:rPr lang="en-US" smtClean="0"/>
-              <a:t>4/21/14</a:t>
+              <a:t>4/21/2014</a:t>
             </a:fld>
             <a:endParaRPr lang="en-US"/>
           </a:p>
@@ -2290,16 +2493,78 @@
           </a:p>
         </p:txBody>
       </p:sp>
+      <p:cxnSp>
+        <p:nvCxnSpPr>
+          <p:cNvPr id="11" name="Straight Connector 10"/>
+          <p:cNvCxnSpPr/>
+          <p:nvPr/>
+        </p:nvCxnSpPr>
+        <p:spPr>
+          <a:xfrm>
+            <a:off x="758952" y="1249362"/>
+            <a:ext cx="3657600" cy="1588"/>
+          </a:xfrm>
+          <a:prstGeom prst="line">
+            <a:avLst/>
+          </a:prstGeom>
+        </p:spPr>
+        <p:style>
+          <a:lnRef idx="1">
+            <a:schemeClr val="accent1"/>
+          </a:lnRef>
+          <a:fillRef idx="0">
+            <a:schemeClr val="accent1"/>
+          </a:fillRef>
+          <a:effectRef idx="0">
+            <a:schemeClr val="accent1"/>
+          </a:effectRef>
+          <a:fontRef idx="minor">
+            <a:schemeClr val="tx1"/>
+          </a:fontRef>
+        </p:style>
+      </p:cxnSp>
+      <p:cxnSp>
+        <p:nvCxnSpPr>
+          <p:cNvPr id="13" name="Straight Connector 12"/>
+          <p:cNvCxnSpPr/>
+          <p:nvPr/>
+        </p:nvCxnSpPr>
+        <p:spPr>
+          <a:xfrm>
+            <a:off x="4645152" y="1249362"/>
+            <a:ext cx="3657600" cy="1588"/>
+          </a:xfrm>
+          <a:prstGeom prst="line">
+            <a:avLst/>
+          </a:prstGeom>
+        </p:spPr>
+        <p:style>
+          <a:lnRef idx="1">
+            <a:schemeClr val="accent1"/>
+          </a:lnRef>
+          <a:fillRef idx="0">
+            <a:schemeClr val="accent1"/>
+          </a:fillRef>
+          <a:effectRef idx="0">
+            <a:schemeClr val="accent1"/>
+          </a:effectRef>
+          <a:fontRef idx="minor">
+            <a:schemeClr val="tx1"/>
+          </a:fontRef>
+        </p:style>
+      </p:cxnSp>
     </p:spTree>
-    <p:extLst>
-      <p:ext uri="{BB962C8B-B14F-4D97-AF65-F5344CB8AC3E}">
-        <p14:creationId xmlns:p14="http://schemas.microsoft.com/office/powerpoint/2010/main" val="1086860738"/>
-      </p:ext>
-    </p:extLst>
   </p:cSld>
   <p:clrMapOvr>
     <a:masterClrMapping/>
   </p:clrMapOvr>
+  <p:timing>
+    <p:tnLst>
+      <p:par>
+        <p:cTn id="1" dur="indefinite" restart="never" nodeType="tmRoot"/>
+      </p:par>
+    </p:tnLst>
+  </p:timing>
 </p:sldLayout>
 </file>
 
@@ -2339,7 +2604,7 @@
               <a:rPr lang="en-US" smtClean="0"/>
               <a:t>Click to edit Master title style</a:t>
             </a:r>
-            <a:endParaRPr lang="en-US"/>
+            <a:endParaRPr lang="en-US" dirty="0"/>
           </a:p>
         </p:txBody>
       </p:sp>
@@ -2360,7 +2625,7 @@
           <a:p>
             <a:fld id="{4AD26688-83F8-AC4D-BBFC-F74327B9A175}" type="datetimeFigureOut">
               <a:rPr lang="en-US" smtClean="0"/>
-              <a:t>4/21/14</a:t>
+              <a:t>4/21/2014</a:t>
             </a:fld>
             <a:endParaRPr lang="en-US"/>
           </a:p>
@@ -2409,15 +2674,17 @@
         </p:txBody>
       </p:sp>
     </p:spTree>
-    <p:extLst>
-      <p:ext uri="{BB962C8B-B14F-4D97-AF65-F5344CB8AC3E}">
-        <p14:creationId xmlns:p14="http://schemas.microsoft.com/office/powerpoint/2010/main" val="142938899"/>
-      </p:ext>
-    </p:extLst>
   </p:cSld>
   <p:clrMapOvr>
     <a:masterClrMapping/>
   </p:clrMapOvr>
+  <p:timing>
+    <p:tnLst>
+      <p:par>
+        <p:cTn id="1" dur="indefinite" restart="never" nodeType="tmRoot"/>
+      </p:par>
+    </p:tnLst>
+  </p:timing>
 </p:sldLayout>
 </file>
 
@@ -2455,7 +2722,7 @@
           <a:p>
             <a:fld id="{4AD26688-83F8-AC4D-BBFC-F74327B9A175}" type="datetimeFigureOut">
               <a:rPr lang="en-US" smtClean="0"/>
-              <a:t>4/21/14</a:t>
+              <a:t>4/21/2014</a:t>
             </a:fld>
             <a:endParaRPr lang="en-US"/>
           </a:p>
@@ -2504,15 +2771,17 @@
         </p:txBody>
       </p:sp>
     </p:spTree>
-    <p:extLst>
-      <p:ext uri="{BB962C8B-B14F-4D97-AF65-F5344CB8AC3E}">
-        <p14:creationId xmlns:p14="http://schemas.microsoft.com/office/powerpoint/2010/main" val="194618499"/>
-      </p:ext>
-    </p:extLst>
   </p:cSld>
   <p:clrMapOvr>
     <a:masterClrMapping/>
   </p:clrMapOvr>
+  <p:timing>
+    <p:tnLst>
+      <p:par>
+        <p:cTn id="1" dur="indefinite" restart="never" nodeType="tmRoot"/>
+      </p:par>
+    </p:tnLst>
+  </p:timing>
 </p:sldLayout>
 </file>
 
@@ -2545,15 +2814,17 @@
         </p:nvSpPr>
         <p:spPr>
           <a:xfrm>
-            <a:off x="457200" y="273050"/>
-            <a:ext cx="3008313" cy="1162050"/>
+            <a:off x="762000" y="4572000"/>
+            <a:ext cx="6784848" cy="1600200"/>
           </a:xfrm>
         </p:spPr>
         <p:txBody>
-          <a:bodyPr anchor="b"/>
+          <a:bodyPr anchor="b">
+            <a:normAutofit/>
+          </a:bodyPr>
           <a:lstStyle>
             <a:lvl1pPr algn="l">
-              <a:defRPr sz="2000" b="1"/>
+              <a:defRPr sz="5400" b="0"/>
             </a:lvl1pPr>
           </a:lstStyle>
           <a:p>
@@ -2577,27 +2848,27 @@
         </p:nvSpPr>
         <p:spPr>
           <a:xfrm>
-            <a:off x="3575050" y="273050"/>
-            <a:ext cx="5111750" cy="5853113"/>
+            <a:off x="3710866" y="457200"/>
+            <a:ext cx="4594934" cy="4114799"/>
           </a:xfrm>
         </p:spPr>
         <p:txBody>
           <a:bodyPr/>
           <a:lstStyle>
             <a:lvl1pPr>
-              <a:defRPr sz="3200"/>
+              <a:defRPr sz="2400"/>
             </a:lvl1pPr>
             <a:lvl2pPr>
-              <a:defRPr sz="2800"/>
+              <a:defRPr sz="2200"/>
             </a:lvl2pPr>
             <a:lvl3pPr>
-              <a:defRPr sz="2400"/>
+              <a:defRPr sz="2000"/>
             </a:lvl3pPr>
             <a:lvl4pPr>
-              <a:defRPr sz="2000"/>
+              <a:defRPr sz="1800"/>
             </a:lvl4pPr>
             <a:lvl5pPr>
-              <a:defRPr sz="2000"/>
+              <a:defRPr sz="1800"/>
             </a:lvl5pPr>
             <a:lvl6pPr>
               <a:defRPr sz="2000"/>
@@ -2646,7 +2917,7 @@
               <a:rPr lang="en-US" smtClean="0"/>
               <a:t>Fifth level</a:t>
             </a:r>
-            <a:endParaRPr lang="en-US"/>
+            <a:endParaRPr lang="en-US" dirty="0"/>
           </a:p>
         </p:txBody>
       </p:sp>
@@ -2662,16 +2933,22 @@
         </p:nvSpPr>
         <p:spPr>
           <a:xfrm>
-            <a:off x="457200" y="1435100"/>
-            <a:ext cx="3008313" cy="4691063"/>
+            <a:off x="762001" y="457200"/>
+            <a:ext cx="2673657" cy="4114800"/>
           </a:xfrm>
         </p:spPr>
         <p:txBody>
-          <a:bodyPr/>
+          <a:bodyPr>
+            <a:normAutofit/>
+          </a:bodyPr>
           <a:lstStyle>
             <a:lvl1pPr marL="0" indent="0">
               <a:buNone/>
-              <a:defRPr sz="1400"/>
+              <a:defRPr sz="2100">
+                <a:solidFill>
+                  <a:schemeClr val="tx2"/>
+                </a:solidFill>
+              </a:defRPr>
             </a:lvl1pPr>
             <a:lvl2pPr marL="457200" indent="0">
               <a:buNone/>
@@ -2732,7 +3009,7 @@
           <a:p>
             <a:fld id="{4AD26688-83F8-AC4D-BBFC-F74327B9A175}" type="datetimeFigureOut">
               <a:rPr lang="en-US" smtClean="0"/>
-              <a:t>4/21/14</a:t>
+              <a:t>4/21/2014</a:t>
             </a:fld>
             <a:endParaRPr lang="en-US"/>
           </a:p>
@@ -2780,16 +3057,56 @@
           </a:p>
         </p:txBody>
       </p:sp>
+      <p:cxnSp>
+        <p:nvCxnSpPr>
+          <p:cNvPr id="10" name="Straight Connector 9"/>
+          <p:cNvCxnSpPr/>
+          <p:nvPr/>
+        </p:nvCxnSpPr>
+        <p:spPr>
+          <a:xfrm rot="5400000">
+            <a:off x="1677194" y="2514600"/>
+            <a:ext cx="3810000" cy="1588"/>
+          </a:xfrm>
+          <a:prstGeom prst="line">
+            <a:avLst/>
+          </a:prstGeom>
+          <a:ln>
+            <a:solidFill>
+              <a:schemeClr val="tx2">
+                <a:lumMod val="50000"/>
+                <a:lumOff val="50000"/>
+              </a:schemeClr>
+            </a:solidFill>
+          </a:ln>
+        </p:spPr>
+        <p:style>
+          <a:lnRef idx="1">
+            <a:schemeClr val="accent1"/>
+          </a:lnRef>
+          <a:fillRef idx="0">
+            <a:schemeClr val="accent1"/>
+          </a:fillRef>
+          <a:effectRef idx="0">
+            <a:schemeClr val="accent1"/>
+          </a:effectRef>
+          <a:fontRef idx="minor">
+            <a:schemeClr val="tx1"/>
+          </a:fontRef>
+        </p:style>
+      </p:cxnSp>
     </p:spTree>
-    <p:extLst>
-      <p:ext uri="{BB962C8B-B14F-4D97-AF65-F5344CB8AC3E}">
-        <p14:creationId xmlns:p14="http://schemas.microsoft.com/office/powerpoint/2010/main" val="684927971"/>
-      </p:ext>
-    </p:extLst>
   </p:cSld>
   <p:clrMapOvr>
     <a:masterClrMapping/>
   </p:clrMapOvr>
+  <p:timing>
+    <p:tnLst>
+      <p:par>
+        <p:cTn id="1" dur="indefinite" restart="never" nodeType="tmRoot"/>
+      </p:par>
+    </p:tnLst>
+  </p:timing>
 </p:sldLayout>
 </file>
 
@@ -2822,15 +3139,17 @@
         </p:nvSpPr>
         <p:spPr>
           <a:xfrm>
-            <a:off x="1792288" y="4800600"/>
-            <a:ext cx="5486400" cy="566738"/>
+            <a:off x="758952" y="4572000"/>
+            <a:ext cx="6784848" cy="1600200"/>
           </a:xfrm>
         </p:spPr>
         <p:txBody>
-          <a:bodyPr anchor="b"/>
+          <a:bodyPr anchor="b">
+            <a:normAutofit/>
+          </a:bodyPr>
           <a:lstStyle>
             <a:lvl1pPr algn="l">
-              <a:defRPr sz="2000" b="1"/>
+              <a:defRPr sz="5400" b="0"/>
             </a:lvl1pPr>
           </a:lstStyle>
           <a:p>
@@ -2838,7 +3157,7 @@
               <a:rPr lang="en-US" smtClean="0"/>
               <a:t>Click to edit Master title style</a:t>
             </a:r>
-            <a:endParaRPr lang="en-US"/>
+            <a:endParaRPr lang="en-US" dirty="0"/>
           </a:p>
         </p:txBody>
       </p:sp>
@@ -2854,9 +3173,14 @@
         </p:nvSpPr>
         <p:spPr>
           <a:xfrm>
-            <a:off x="1792288" y="612775"/>
-            <a:ext cx="5486400" cy="4114800"/>
+            <a:off x="777240" y="457200"/>
+            <a:ext cx="7543800" cy="2895600"/>
           </a:xfrm>
+          <a:ln w="6350">
+            <a:solidFill>
+              <a:schemeClr val="tx2"/>
+            </a:solidFill>
+          </a:ln>
         </p:spPr>
         <p:txBody>
           <a:bodyPr/>
@@ -2899,6 +3223,10 @@
             </a:lvl9pPr>
           </a:lstStyle>
           <a:p>
+            <a:r>
+              <a:rPr lang="en-US" smtClean="0"/>
+              <a:t>Click icon to add picture</a:t>
+            </a:r>
             <a:endParaRPr lang="en-US"/>
           </a:p>
         </p:txBody>
@@ -2915,16 +3243,18 @@
         </p:nvSpPr>
         <p:spPr>
           <a:xfrm>
-            <a:off x="1792288" y="5367338"/>
-            <a:ext cx="5486400" cy="804862"/>
+            <a:off x="850392" y="3505200"/>
+            <a:ext cx="7391400" cy="804862"/>
           </a:xfrm>
         </p:spPr>
         <p:txBody>
-          <a:bodyPr/>
+          <a:bodyPr anchor="t" anchorCtr="0">
+            <a:normAutofit/>
+          </a:bodyPr>
           <a:lstStyle>
             <a:lvl1pPr marL="0" indent="0">
               <a:buNone/>
-              <a:defRPr sz="1400"/>
+              <a:defRPr sz="1800"/>
             </a:lvl1pPr>
             <a:lvl2pPr marL="457200" indent="0">
               <a:buNone/>
@@ -2985,7 +3315,7 @@
           <a:p>
             <a:fld id="{4AD26688-83F8-AC4D-BBFC-F74327B9A175}" type="datetimeFigureOut">
               <a:rPr lang="en-US" smtClean="0"/>
-              <a:t>4/21/14</a:t>
+              <a:t>4/21/2014</a:t>
             </a:fld>
             <a:endParaRPr lang="en-US"/>
           </a:p>
@@ -3034,15 +3364,17 @@
         </p:txBody>
       </p:sp>
     </p:spTree>
-    <p:extLst>
-      <p:ext uri="{BB962C8B-B14F-4D97-AF65-F5344CB8AC3E}">
-        <p14:creationId xmlns:p14="http://schemas.microsoft.com/office/powerpoint/2010/main" val="3427750342"/>
-      </p:ext>
-    </p:extLst>
   </p:cSld>
   <p:clrMapOvr>
     <a:masterClrMapping/>
   </p:clrMapOvr>
+  <p:timing>
+    <p:tnLst>
+      <p:par>
+        <p:cTn id="1" dur="indefinite" restart="never" nodeType="tmRoot"/>
+      </p:par>
+    </p:tnLst>
+  </p:timing>
 </p:sldLayout>
 </file>
 
@@ -3050,7 +3382,7 @@
 <p:sldMaster xmlns:a="http://schemas.openxmlformats.org/drawingml/2006/main" xmlns:r="http://schemas.openxmlformats.org/officeDocument/2006/relationships" xmlns:p="http://schemas.openxmlformats.org/presentationml/2006/main">
   <p:cSld>
     <p:bg>
-      <p:bgRef idx="1001">
+      <p:bgRef idx="1003">
         <a:schemeClr val="bg1"/>
       </p:bgRef>
     </p:bg>
@@ -3080,15 +3412,15 @@
         </p:nvSpPr>
         <p:spPr>
           <a:xfrm>
-            <a:off x="457200" y="274638"/>
-            <a:ext cx="8229600" cy="1143000"/>
+            <a:off x="762000" y="4572000"/>
+            <a:ext cx="6781800" cy="1600200"/>
           </a:xfrm>
           <a:prstGeom prst="rect">
             <a:avLst/>
           </a:prstGeom>
         </p:spPr>
         <p:txBody>
-          <a:bodyPr vert="horz" lIns="91440" tIns="45720" rIns="91440" bIns="45720" rtlCol="0" anchor="ctr">
+          <a:bodyPr vert="horz" lIns="91440" tIns="45720" rIns="91440" bIns="45720" rtlCol="0" anchor="b" anchorCtr="0">
             <a:normAutofit/>
           </a:bodyPr>
           <a:lstStyle/>
@@ -3097,7 +3429,7 @@
               <a:rPr lang="en-US" smtClean="0"/>
               <a:t>Click to edit Master title style</a:t>
             </a:r>
-            <a:endParaRPr lang="en-US"/>
+            <a:endParaRPr lang="en-US" dirty="0"/>
           </a:p>
         </p:txBody>
       </p:sp>
@@ -3113,15 +3445,15 @@
         </p:nvSpPr>
         <p:spPr>
           <a:xfrm>
-            <a:off x="457200" y="1600200"/>
-            <a:ext cx="8229600" cy="4525963"/>
+            <a:off x="762000" y="685800"/>
+            <a:ext cx="7543800" cy="3886200"/>
           </a:xfrm>
           <a:prstGeom prst="rect">
             <a:avLst/>
           </a:prstGeom>
         </p:spPr>
         <p:txBody>
-          <a:bodyPr vert="horz" lIns="91440" tIns="45720" rIns="91440" bIns="45720" rtlCol="0">
+          <a:bodyPr vert="horz" lIns="91440" tIns="45720" rIns="91440" bIns="45720" rtlCol="0" anchor="ctr" anchorCtr="0">
             <a:normAutofit/>
           </a:bodyPr>
           <a:lstStyle/>
@@ -3159,7 +3491,7 @@
               <a:rPr lang="en-US" smtClean="0"/>
               <a:t>Fifth level</a:t>
             </a:r>
-            <a:endParaRPr lang="en-US"/>
+            <a:endParaRPr lang="en-US" dirty="0"/>
           </a:p>
         </p:txBody>
       </p:sp>
@@ -3175,7 +3507,7 @@
         </p:nvSpPr>
         <p:spPr>
           <a:xfrm>
-            <a:off x="457200" y="6356350"/>
+            <a:off x="6248400" y="6208776"/>
             <a:ext cx="2133600" cy="365125"/>
           </a:xfrm>
           <a:prstGeom prst="rect">
@@ -3185,39 +3517,79 @@
         <p:txBody>
           <a:bodyPr vert="horz" lIns="91440" tIns="45720" rIns="91440" bIns="45720" rtlCol="0" anchor="ctr"/>
           <a:lstStyle>
+            <a:lvl1pPr algn="r">
+              <a:defRPr sz="1200" b="1">
+                <a:solidFill>
+                  <a:schemeClr val="tx2">
+                    <a:lumMod val="90000"/>
+                    <a:lumOff val="10000"/>
+                  </a:schemeClr>
+                </a:solidFill>
+                <a:latin typeface="+mn-lt"/>
+              </a:defRPr>
+            </a:lvl1pPr>
+          </a:lstStyle>
+          <a:p>
+            <a:fld id="{4AD26688-83F8-AC4D-BBFC-F74327B9A175}" type="datetimeFigureOut">
+              <a:rPr lang="en-US" smtClean="0"/>
+              <a:t>4/21/2014</a:t>
+            </a:fld>
+            <a:endParaRPr lang="en-US"/>
+          </a:p>
+        </p:txBody>
+      </p:sp>
+      <p:sp>
+        <p:nvSpPr>
+          <p:cNvPr id="5" name="Footer Placeholder 4"/>
+          <p:cNvSpPr>
+            <a:spLocks noGrp="1"/>
+          </p:cNvSpPr>
+          <p:nvPr>
+            <p:ph type="ftr" sz="quarter" idx="3"/>
+          </p:nvPr>
+        </p:nvSpPr>
+        <p:spPr>
+          <a:xfrm>
+            <a:off x="761999" y="6208776"/>
+            <a:ext cx="4873869" cy="365125"/>
+          </a:xfrm>
+          <a:prstGeom prst="rect">
+            <a:avLst/>
+          </a:prstGeom>
+        </p:spPr>
+        <p:txBody>
+          <a:bodyPr vert="horz" lIns="91440" tIns="45720" rIns="91440" bIns="45720" rtlCol="0" anchor="ctr"/>
+          <a:lstStyle>
             <a:lvl1pPr algn="l">
-              <a:defRPr sz="1200">
+              <a:defRPr sz="1200" b="1">
                 <a:solidFill>
-                  <a:schemeClr val="tx1">
-                    <a:tint val="75000"/>
+                  <a:schemeClr val="tx2">
+                    <a:lumMod val="90000"/>
+                    <a:lumOff val="10000"/>
                   </a:schemeClr>
                 </a:solidFill>
               </a:defRPr>
             </a:lvl1pPr>
           </a:lstStyle>
           <a:p>
-            <a:fld id="{4AD26688-83F8-AC4D-BBFC-F74327B9A175}" type="datetimeFigureOut">
-              <a:rPr lang="en-US" smtClean="0"/>
-              <a:t>4/21/14</a:t>
-            </a:fld>
             <a:endParaRPr lang="en-US"/>
           </a:p>
         </p:txBody>
       </p:sp>
       <p:sp>
         <p:nvSpPr>
-          <p:cNvPr id="5" name="Footer Placeholder 4"/>
-          <p:cNvSpPr>
-            <a:spLocks noGrp="1"/>
-          </p:cNvSpPr>
-          <p:nvPr>
-            <p:ph type="ftr" sz="quarter" idx="3"/>
+          <p:cNvPr id="6" name="Slide Number Placeholder 5"/>
+          <p:cNvSpPr>
+            <a:spLocks noGrp="1"/>
+          </p:cNvSpPr>
+          <p:nvPr>
+            <p:ph type="sldNum" sz="quarter" idx="4"/>
           </p:nvPr>
         </p:nvSpPr>
         <p:spPr>
           <a:xfrm>
-            <a:off x="3124200" y="6356350"/>
-            <a:ext cx="2895600" cy="365125"/>
+            <a:off x="7620000" y="5687568"/>
+            <a:ext cx="762000" cy="365125"/>
           </a:xfrm>
           <a:prstGeom prst="rect">
             <a:avLst/>
@@ -3226,230 +3598,369 @@
         <p:txBody>
           <a:bodyPr vert="horz" lIns="91440" tIns="45720" rIns="91440" bIns="45720" rtlCol="0" anchor="ctr"/>
           <a:lstStyle>
-            <a:lvl1pPr algn="ctr">
-              <a:defRPr sz="1200">
+            <a:lvl1pPr algn="r">
+              <a:defRPr sz="2400">
                 <a:solidFill>
                   <a:schemeClr val="tx1">
-                    <a:tint val="75000"/>
+                    <a:lumMod val="85000"/>
+                    <a:lumOff val="15000"/>
                   </a:schemeClr>
                 </a:solidFill>
+                <a:latin typeface="+mj-lt"/>
               </a:defRPr>
             </a:lvl1pPr>
           </a:lstStyle>
           <a:p>
+            <a:fld id="{9C2D9841-BB6E-554C-A300-D53EA76E02B8}" type="slidenum">
+              <a:rPr lang="en-US" smtClean="0"/>
+              <a:t>‹#›</a:t>
+            </a:fld>
             <a:endParaRPr lang="en-US"/>
           </a:p>
         </p:txBody>
       </p:sp>
       <p:sp>
         <p:nvSpPr>
-          <p:cNvPr id="6" name="Slide Number Placeholder 5"/>
-          <p:cNvSpPr>
-            <a:spLocks noGrp="1"/>
-          </p:cNvSpPr>
-          <p:nvPr>
-            <p:ph type="sldNum" sz="quarter" idx="4"/>
-          </p:nvPr>
+          <p:cNvPr id="8" name="Rectangle 7"/>
+          <p:cNvSpPr/>
+          <p:nvPr/>
         </p:nvSpPr>
         <p:spPr>
           <a:xfrm>
-            <a:off x="6553200" y="6356350"/>
-            <a:ext cx="2133600" cy="365125"/>
+            <a:off x="777240" y="0"/>
+            <a:ext cx="7543800" cy="381000"/>
           </a:xfrm>
           <a:prstGeom prst="rect">
             <a:avLst/>
           </a:prstGeom>
+          <a:ln>
+            <a:noFill/>
+          </a:ln>
         </p:spPr>
-        <p:txBody>
-          <a:bodyPr vert="horz" lIns="91440" tIns="45720" rIns="91440" bIns="45720" rtlCol="0" anchor="ctr"/>
-          <a:lstStyle>
-            <a:lvl1pPr algn="r">
-              <a:defRPr sz="1200">
-                <a:solidFill>
-                  <a:schemeClr val="tx1">
-                    <a:tint val="75000"/>
-                  </a:schemeClr>
-                </a:solidFill>
-              </a:defRPr>
-            </a:lvl1pPr>
-          </a:lstStyle>
-          <a:p>
-            <a:fld id="{9C2D9841-BB6E-554C-A300-D53EA76E02B8}" type="slidenum">
-              <a:rPr lang="en-US" smtClean="0"/>
-              <a:t>‹#›</a:t>
-            </a:fld>
+        <p:style>
+          <a:lnRef idx="2">
+            <a:schemeClr val="accent1">
+              <a:shade val="50000"/>
+            </a:schemeClr>
+          </a:lnRef>
+          <a:fillRef idx="1">
+            <a:schemeClr val="accent1"/>
+          </a:fillRef>
+          <a:effectRef idx="0">
+            <a:schemeClr val="accent1"/>
+          </a:effectRef>
+          <a:fontRef idx="minor">
+            <a:schemeClr val="lt1"/>
+          </a:fontRef>
+        </p:style>
+        <p:txBody>
+          <a:bodyPr rtlCol="0" anchor="ctr"/>
+          <a:lstStyle/>
+          <a:p>
+            <a:pPr algn="ctr"/>
             <a:endParaRPr lang="en-US"/>
           </a:p>
         </p:txBody>
       </p:sp>
+      <p:sp>
+        <p:nvSpPr>
+          <p:cNvPr id="9" name="Rectangle 8"/>
+          <p:cNvSpPr/>
+          <p:nvPr/>
+        </p:nvSpPr>
+        <p:spPr>
+          <a:xfrm>
+            <a:off x="777240" y="6172200"/>
+            <a:ext cx="7543800" cy="27432"/>
+          </a:xfrm>
+          <a:prstGeom prst="rect">
+            <a:avLst/>
+          </a:prstGeom>
+          <a:ln>
+            <a:noFill/>
+          </a:ln>
+        </p:spPr>
+        <p:style>
+          <a:lnRef idx="2">
+            <a:schemeClr val="accent1">
+              <a:shade val="50000"/>
+            </a:schemeClr>
+          </a:lnRef>
+          <a:fillRef idx="1">
+            <a:schemeClr val="accent1"/>
+          </a:fillRef>
+          <a:effectRef idx="0">
+            <a:schemeClr val="accent1"/>
+          </a:effectRef>
+          <a:fontRef idx="minor">
+            <a:schemeClr val="lt1"/>
+          </a:fontRef>
+        </p:style>
+        <p:txBody>
+          <a:bodyPr rtlCol="0" anchor="ctr"/>
+          <a:lstStyle/>
+          <a:p>
+            <a:pPr algn="ctr"/>
+            <a:endParaRPr lang="en-US"/>
+          </a:p>
+        </p:txBody>
+      </p:sp>
     </p:spTree>
-    <p:extLst>
-      <p:ext uri="{BB962C8B-B14F-4D97-AF65-F5344CB8AC3E}">
-        <p14:creationId xmlns:p14="http://schemas.microsoft.com/office/powerpoint/2010/main" val="3614514089"/>
-      </p:ext>
-    </p:extLst>
   </p:cSld>
   <p:clrMap bg1="lt1" tx1="dk1" bg2="lt2" tx2="dk2" accent1="accent1" accent2="accent2" accent3="accent3" accent4="accent4" accent5="accent5" accent6="accent6" hlink="hlink" folHlink="folHlink"/>
   <p:sldLayoutIdLst>
-    <p:sldLayoutId id="2147483649" r:id="rId1"/>
-    <p:sldLayoutId id="2147483650" r:id="rId2"/>
-    <p:sldLayoutId id="2147483651" r:id="rId3"/>
-    <p:sldLayoutId id="2147483652" r:id="rId4"/>
-    <p:sldLayoutId id="2147483653" r:id="rId5"/>
-    <p:sldLayoutId id="2147483654" r:id="rId6"/>
-    <p:sldLayoutId id="2147483655" r:id="rId7"/>
-    <p:sldLayoutId id="2147483656" r:id="rId8"/>
-    <p:sldLayoutId id="2147483657" r:id="rId9"/>
-    <p:sldLayoutId id="2147483658" r:id="rId10"/>
-    <p:sldLayoutId id="2147483659" r:id="rId11"/>
+    <p:sldLayoutId id="2147483697" r:id="rId1"/>
+    <p:sldLayoutId id="2147483698" r:id="rId2"/>
+    <p:sldLayoutId id="2147483699" r:id="rId3"/>
+    <p:sldLayoutId id="2147483700" r:id="rId4"/>
+    <p:sldLayoutId id="2147483701" r:id="rId5"/>
+    <p:sldLayoutId id="2147483702" r:id="rId6"/>
+    <p:sldLayoutId id="2147483703" r:id="rId7"/>
+    <p:sldLayoutId id="2147483704" r:id="rId8"/>
+    <p:sldLayoutId id="2147483705" r:id="rId9"/>
+    <p:sldLayoutId id="2147483706" r:id="rId10"/>
+    <p:sldLayoutId id="2147483707" r:id="rId11"/>
   </p:sldLayoutIdLst>
+  <p:timing>
+    <p:tnLst>
+      <p:par>
+        <p:cTn id="1" dur="indefinite" restart="never" nodeType="tmRoot"/>
+      </p:par>
+    </p:tnLst>
+  </p:timing>
   <p:txStyles>
     <p:titleStyle>
-      <a:lvl1pPr algn="ctr" defTabSz="457200" rtl="0" eaLnBrk="1" latinLnBrk="0" hangingPunct="1">
+      <a:lvl1pPr algn="l" defTabSz="914400" rtl="0" eaLnBrk="1" latinLnBrk="0" hangingPunct="1">
         <a:spcBef>
           <a:spcPct val="0"/>
         </a:spcBef>
         <a:buNone/>
-        <a:defRPr sz="4400" kern="1200">
+        <a:defRPr sz="5400" kern="1200">
           <a:solidFill>
-            <a:schemeClr val="tx1"/>
+            <a:schemeClr val="tx1">
+              <a:lumMod val="85000"/>
+              <a:lumOff val="15000"/>
+            </a:schemeClr>
           </a:solidFill>
           <a:latin typeface="+mj-lt"/>
           <a:ea typeface="+mj-ea"/>
           <a:cs typeface="+mj-cs"/>
         </a:defRPr>
       </a:lvl1pPr>
+      <a:lvl2pPr eaLnBrk="1" hangingPunct="1">
+        <a:defRPr>
+          <a:solidFill>
+            <a:schemeClr val="tx2"/>
+          </a:solidFill>
+        </a:defRPr>
+      </a:lvl2pPr>
+      <a:lvl3pPr eaLnBrk="1" hangingPunct="1">
+        <a:defRPr>
+          <a:solidFill>
+            <a:schemeClr val="tx2"/>
+          </a:solidFill>
+        </a:defRPr>
+      </a:lvl3pPr>
+      <a:lvl4pPr eaLnBrk="1" hangingPunct="1">
+        <a:defRPr>
+          <a:solidFill>
+            <a:schemeClr val="tx2"/>
+          </a:solidFill>
+        </a:defRPr>
+      </a:lvl4pPr>
+      <a:lvl5pPr eaLnBrk="1" hangingPunct="1">
+        <a:defRPr>
+          <a:solidFill>
+            <a:schemeClr val="tx2"/>
+          </a:solidFill>
+        </a:defRPr>
+      </a:lvl5pPr>
+      <a:lvl6pPr eaLnBrk="1" hangingPunct="1">
+        <a:defRPr>
+          <a:solidFill>
+            <a:schemeClr val="tx2"/>
+          </a:solidFill>
+        </a:defRPr>
+      </a:lvl6pPr>
+      <a:lvl7pPr eaLnBrk="1" hangingPunct="1">
+        <a:defRPr>
+          <a:solidFill>
+            <a:schemeClr val="tx2"/>
+          </a:solidFill>
+        </a:defRPr>
+      </a:lvl7pPr>
+      <a:lvl8pPr eaLnBrk="1" hangingPunct="1">
+        <a:defRPr>
+          <a:solidFill>
+            <a:schemeClr val="tx2"/>
+          </a:solidFill>
+        </a:defRPr>
+      </a:lvl8pPr>
+      <a:lvl9pPr eaLnBrk="1" hangingPunct="1">
+        <a:defRPr>
+          <a:solidFill>
+            <a:schemeClr val="tx2"/>
+          </a:solidFill>
+        </a:defRPr>
+      </a:lvl9pPr>
     </p:titleStyle>
     <p:bodyStyle>
-      <a:lvl1pPr marL="342900" indent="-342900" algn="l" defTabSz="457200" rtl="0" eaLnBrk="1" latinLnBrk="0" hangingPunct="1">
+      <a:lvl1pPr marL="274320" indent="-274320" algn="l" defTabSz="914400" rtl="0" eaLnBrk="1" latinLnBrk="0" hangingPunct="1">
         <a:spcBef>
           <a:spcPct val="20000"/>
         </a:spcBef>
-        <a:buFont typeface="Arial"/>
+        <a:buClr>
+          <a:schemeClr val="accent1"/>
+        </a:buClr>
+        <a:buFont typeface="Arial" pitchFamily="34" charset="0"/>
         <a:buChar char="•"/>
-        <a:defRPr sz="3200" kern="1200">
+        <a:defRPr sz="2400" kern="1200">
           <a:solidFill>
-            <a:schemeClr val="tx1"/>
+            <a:schemeClr val="tx2"/>
           </a:solidFill>
           <a:latin typeface="+mn-lt"/>
           <a:ea typeface="+mn-ea"/>
           <a:cs typeface="+mn-cs"/>
         </a:defRPr>
       </a:lvl1pPr>
-      <a:lvl2pPr marL="742950" indent="-285750" algn="l" defTabSz="457200" rtl="0" eaLnBrk="1" latinLnBrk="0" hangingPunct="1">
+      <a:lvl2pPr marL="594360" indent="-274320" algn="l" defTabSz="914400" rtl="0" eaLnBrk="1" latinLnBrk="0" hangingPunct="1">
         <a:spcBef>
           <a:spcPct val="20000"/>
         </a:spcBef>
-        <a:buFont typeface="Arial"/>
-        <a:buChar char="–"/>
-        <a:defRPr sz="2800" kern="1200">
+        <a:buClr>
+          <a:schemeClr val="accent1"/>
+        </a:buClr>
+        <a:buFont typeface="Arial" pitchFamily="34" charset="0"/>
+        <a:buChar char="•"/>
+        <a:defRPr sz="2200" kern="1200">
           <a:solidFill>
-            <a:schemeClr val="tx1"/>
+            <a:schemeClr val="tx2"/>
           </a:solidFill>
           <a:latin typeface="+mn-lt"/>
           <a:ea typeface="+mn-ea"/>
           <a:cs typeface="+mn-cs"/>
         </a:defRPr>
       </a:lvl2pPr>
-      <a:lvl3pPr marL="1143000" indent="-228600" algn="l" defTabSz="457200" rtl="0" eaLnBrk="1" latinLnBrk="0" hangingPunct="1">
+      <a:lvl3pPr marL="868680" indent="-228600" algn="l" defTabSz="914400" rtl="0" eaLnBrk="1" latinLnBrk="0" hangingPunct="1">
         <a:spcBef>
           <a:spcPct val="20000"/>
         </a:spcBef>
-        <a:buFont typeface="Arial"/>
+        <a:buClr>
+          <a:schemeClr val="accent1"/>
+        </a:buClr>
+        <a:buFont typeface="Arial" pitchFamily="34" charset="0"/>
         <a:buChar char="•"/>
-        <a:defRPr sz="2400" kern="1200">
+        <a:defRPr sz="2000" kern="1200">
           <a:solidFill>
-            <a:schemeClr val="tx1"/>
+            <a:schemeClr val="tx2"/>
           </a:solidFill>
           <a:latin typeface="+mn-lt"/>
           <a:ea typeface="+mn-ea"/>
           <a:cs typeface="+mn-cs"/>
         </a:defRPr>
       </a:lvl3pPr>
-      <a:lvl4pPr marL="1600200" indent="-228600" algn="l" defTabSz="457200" rtl="0" eaLnBrk="1" latinLnBrk="0" hangingPunct="1">
+      <a:lvl4pPr marL="1143000" indent="-228600" algn="l" defTabSz="914400" rtl="0" eaLnBrk="1" latinLnBrk="0" hangingPunct="1">
         <a:spcBef>
           <a:spcPct val="20000"/>
         </a:spcBef>
-        <a:buFont typeface="Arial"/>
-        <a:buChar char="–"/>
-        <a:defRPr sz="2000" kern="1200">
+        <a:buClr>
+          <a:schemeClr val="accent1"/>
+        </a:buClr>
+        <a:buFont typeface="Arial" pitchFamily="34" charset="0"/>
+        <a:buChar char="•"/>
+        <a:defRPr sz="1800" kern="1200">
           <a:solidFill>
-            <a:schemeClr val="tx1"/>
+            <a:schemeClr val="tx2"/>
           </a:solidFill>
           <a:latin typeface="+mn-lt"/>
           <a:ea typeface="+mn-ea"/>
           <a:cs typeface="+mn-cs"/>
         </a:defRPr>
       </a:lvl4pPr>
-      <a:lvl5pPr marL="2057400" indent="-228600" algn="l" defTabSz="457200" rtl="0" eaLnBrk="1" latinLnBrk="0" hangingPunct="1">
+      <a:lvl5pPr marL="1371600" indent="-228600" algn="l" defTabSz="914400" rtl="0" eaLnBrk="1" latinLnBrk="0" hangingPunct="1">
         <a:spcBef>
           <a:spcPct val="20000"/>
         </a:spcBef>
-        <a:buFont typeface="Arial"/>
-        <a:buChar char="»"/>
-        <a:defRPr sz="2000" kern="1200">
+        <a:buClr>
+          <a:schemeClr val="accent1"/>
+        </a:buClr>
+        <a:buFont typeface="Arial" pitchFamily="34" charset="0"/>
+        <a:buChar char="•"/>
+        <a:defRPr sz="1800" kern="1200" baseline="0">
           <a:solidFill>
-            <a:schemeClr val="tx1"/>
+            <a:schemeClr val="tx2"/>
           </a:solidFill>
           <a:latin typeface="+mn-lt"/>
           <a:ea typeface="+mn-ea"/>
           <a:cs typeface="+mn-cs"/>
         </a:defRPr>
       </a:lvl5pPr>
-      <a:lvl6pPr marL="2514600" indent="-228600" algn="l" defTabSz="457200" rtl="0" eaLnBrk="1" latinLnBrk="0" hangingPunct="1">
+      <a:lvl6pPr marL="1645920" indent="-228600" algn="l" defTabSz="914400" rtl="0" eaLnBrk="1" latinLnBrk="0" hangingPunct="1">
         <a:spcBef>
           <a:spcPct val="20000"/>
         </a:spcBef>
-        <a:buFont typeface="Arial"/>
+        <a:buClr>
+          <a:schemeClr val="accent1"/>
+        </a:buClr>
+        <a:buFont typeface="Arial" pitchFamily="34" charset="0"/>
         <a:buChar char="•"/>
-        <a:defRPr sz="2000" kern="1200">
+        <a:defRPr sz="1600" kern="1200">
           <a:solidFill>
-            <a:schemeClr val="tx1"/>
+            <a:schemeClr val="tx2"/>
           </a:solidFill>
           <a:latin typeface="+mn-lt"/>
           <a:ea typeface="+mn-ea"/>
           <a:cs typeface="+mn-cs"/>
         </a:defRPr>
       </a:lvl6pPr>
-      <a:lvl7pPr marL="2971800" indent="-228600" algn="l" defTabSz="457200" rtl="0" eaLnBrk="1" latinLnBrk="0" hangingPunct="1">
+      <a:lvl7pPr marL="1901952" indent="-228600" algn="l" defTabSz="914400" rtl="0" eaLnBrk="1" latinLnBrk="0" hangingPunct="1">
         <a:spcBef>
           <a:spcPct val="20000"/>
         </a:spcBef>
-        <a:buFont typeface="Arial"/>
+        <a:buClr>
+          <a:schemeClr val="accent1"/>
+        </a:buClr>
+        <a:buFont typeface="Arial" pitchFamily="34" charset="0"/>
         <a:buChar char="•"/>
-        <a:defRPr sz="2000" kern="1200">
+        <a:defRPr sz="1600" kern="1200">
           <a:solidFill>
-            <a:schemeClr val="tx1"/>
+            <a:schemeClr val="tx2"/>
           </a:solidFill>
           <a:latin typeface="+mn-lt"/>
           <a:ea typeface="+mn-ea"/>
           <a:cs typeface="+mn-cs"/>
         </a:defRPr>
       </a:lvl7pPr>
-      <a:lvl8pPr marL="3429000" indent="-228600" algn="l" defTabSz="457200" rtl="0" eaLnBrk="1" latinLnBrk="0" hangingPunct="1">
+      <a:lvl8pPr marL="2194560" indent="-228600" algn="l" defTabSz="914400" rtl="0" eaLnBrk="1" latinLnBrk="0" hangingPunct="1">
         <a:spcBef>
           <a:spcPct val="20000"/>
         </a:spcBef>
-        <a:buFont typeface="Arial"/>
+        <a:buClr>
+          <a:schemeClr val="accent1"/>
+        </a:buClr>
+        <a:buFont typeface="Arial" pitchFamily="34" charset="0"/>
         <a:buChar char="•"/>
-        <a:defRPr sz="2000" kern="1200">
+        <a:defRPr sz="1600" kern="1200">
           <a:solidFill>
-            <a:schemeClr val="tx1"/>
+            <a:schemeClr val="tx2"/>
           </a:solidFill>
           <a:latin typeface="+mn-lt"/>
           <a:ea typeface="+mn-ea"/>
           <a:cs typeface="+mn-cs"/>
         </a:defRPr>
       </a:lvl8pPr>
-      <a:lvl9pPr marL="3886200" indent="-228600" algn="l" defTabSz="457200" rtl="0" eaLnBrk="1" latinLnBrk="0" hangingPunct="1">
+      <a:lvl9pPr marL="2468880" indent="-228600" algn="l" defTabSz="914400" rtl="0" eaLnBrk="1" latinLnBrk="0" hangingPunct="1">
         <a:spcBef>
           <a:spcPct val="20000"/>
         </a:spcBef>
-        <a:buFont typeface="Arial"/>
+        <a:buClr>
+          <a:schemeClr val="accent1"/>
+        </a:buClr>
+        <a:buFont typeface="Arial" pitchFamily="34" charset="0"/>
         <a:buChar char="•"/>
-        <a:defRPr sz="2000" kern="1200">
+        <a:defRPr sz="1600" kern="1200">
           <a:solidFill>
-            <a:schemeClr val="tx1"/>
+            <a:schemeClr val="tx2"/>
           </a:solidFill>
           <a:latin typeface="+mn-lt"/>
           <a:ea typeface="+mn-ea"/>
@@ -3461,7 +3972,7 @@
       <a:defPPr>
         <a:defRPr lang="en-US"/>
       </a:defPPr>
-      <a:lvl1pPr marL="0" algn="l" defTabSz="457200" rtl="0" eaLnBrk="1" latinLnBrk="0" hangingPunct="1">
+      <a:lvl1pPr marL="0" algn="l" defTabSz="914400" rtl="0" eaLnBrk="1" latinLnBrk="0" hangingPunct="1">
         <a:defRPr sz="1800" kern="1200">
           <a:solidFill>
             <a:schemeClr val="tx1"/>
@@ -3471,7 +3982,7 @@
           <a:cs typeface="+mn-cs"/>
         </a:defRPr>
       </a:lvl1pPr>
-      <a:lvl2pPr marL="457200" algn="l" defTabSz="457200" rtl="0" eaLnBrk="1" latinLnBrk="0" hangingPunct="1">
+      <a:lvl2pPr marL="457200" algn="l" defTabSz="914400" rtl="0" eaLnBrk="1" latinLnBrk="0" hangingPunct="1">
         <a:defRPr sz="1800" kern="1200">
           <a:solidFill>
             <a:schemeClr val="tx1"/>
@@ -3481,7 +3992,7 @@
           <a:cs typeface="+mn-cs"/>
         </a:defRPr>
       </a:lvl2pPr>
-      <a:lvl3pPr marL="914400" algn="l" defTabSz="457200" rtl="0" eaLnBrk="1" latinLnBrk="0" hangingPunct="1">
+      <a:lvl3pPr marL="914400" algn="l" defTabSz="914400" rtl="0" eaLnBrk="1" latinLnBrk="0" hangingPunct="1">
         <a:defRPr sz="1800" kern="1200">
           <a:solidFill>
             <a:schemeClr val="tx1"/>
@@ -3491,7 +4002,7 @@
           <a:cs typeface="+mn-cs"/>
         </a:defRPr>
       </a:lvl3pPr>
-      <a:lvl4pPr marL="1371600" algn="l" defTabSz="457200" rtl="0" eaLnBrk="1" latinLnBrk="0" hangingPunct="1">
+      <a:lvl4pPr marL="1371600" algn="l" defTabSz="914400" rtl="0" eaLnBrk="1" latinLnBrk="0" hangingPunct="1">
         <a:defRPr sz="1800" kern="1200">
           <a:solidFill>
             <a:schemeClr val="tx1"/>
@@ -3501,7 +4012,7 @@
           <a:cs typeface="+mn-cs"/>
         </a:defRPr>
       </a:lvl4pPr>
-      <a:lvl5pPr marL="1828800" algn="l" defTabSz="457200" rtl="0" eaLnBrk="1" latinLnBrk="0" hangingPunct="1">
+      <a:lvl5pPr marL="1828800" algn="l" defTabSz="914400" rtl="0" eaLnBrk="1" latinLnBrk="0" hangingPunct="1">
         <a:defRPr sz="1800" kern="1200">
           <a:solidFill>
             <a:schemeClr val="tx1"/>
@@ -3511,7 +4022,7 @@
           <a:cs typeface="+mn-cs"/>
         </a:defRPr>
       </a:lvl5pPr>
-      <a:lvl6pPr marL="2286000" algn="l" defTabSz="457200" rtl="0" eaLnBrk="1" latinLnBrk="0" hangingPunct="1">
+      <a:lvl6pPr marL="2286000" algn="l" defTabSz="914400" rtl="0" eaLnBrk="1" latinLnBrk="0" hangingPunct="1">
         <a:defRPr sz="1800" kern="1200">
           <a:solidFill>
             <a:schemeClr val="tx1"/>
@@ -3521,7 +4032,7 @@
           <a:cs typeface="+mn-cs"/>
         </a:defRPr>
       </a:lvl6pPr>
-      <a:lvl7pPr marL="2743200" algn="l" defTabSz="457200" rtl="0" eaLnBrk="1" latinLnBrk="0" hangingPunct="1">
+      <a:lvl7pPr marL="2743200" algn="l" defTabSz="914400" rtl="0" eaLnBrk="1" latinLnBrk="0" hangingPunct="1">
         <a:defRPr sz="1800" kern="1200">
           <a:solidFill>
             <a:schemeClr val="tx1"/>
@@ -3531,7 +4042,7 @@
           <a:cs typeface="+mn-cs"/>
         </a:defRPr>
       </a:lvl7pPr>
-      <a:lvl8pPr marL="3200400" algn="l" defTabSz="457200" rtl="0" eaLnBrk="1" latinLnBrk="0" hangingPunct="1">
+      <a:lvl8pPr marL="3200400" algn="l" defTabSz="914400" rtl="0" eaLnBrk="1" latinLnBrk="0" hangingPunct="1">
         <a:defRPr sz="1800" kern="1200">
           <a:solidFill>
             <a:schemeClr val="tx1"/>
@@ -3541,7 +4052,7 @@
           <a:cs typeface="+mn-cs"/>
         </a:defRPr>
       </a:lvl8pPr>
-      <a:lvl9pPr marL="3657600" algn="l" defTabSz="457200" rtl="0" eaLnBrk="1" latinLnBrk="0" hangingPunct="1">
+      <a:lvl9pPr marL="3657600" algn="l" defTabSz="914400" rtl="0" eaLnBrk="1" latinLnBrk="0" hangingPunct="1">
         <a:defRPr sz="1800" kern="1200">
           <a:solidFill>
             <a:schemeClr val="tx1"/>
@@ -3608,31 +4119,33 @@
         </p:nvSpPr>
         <p:spPr/>
         <p:txBody>
-          <a:bodyPr/>
-          <a:lstStyle/>
-          <a:p>
-            <a:r>
-              <a:rPr lang="en-US" dirty="0" smtClean="0"/>
+          <a:bodyPr>
+            <a:normAutofit fontScale="77500" lnSpcReduction="20000"/>
+          </a:bodyPr>
+          <a:lstStyle/>
+          <a:p>
+            <a:r>
+              <a:rPr lang="en-US" b="1" dirty="0" smtClean="0"/>
               <a:t>David Pennington</a:t>
             </a:r>
             <a:br>
-              <a:rPr lang="en-US" dirty="0" smtClean="0"/>
+              <a:rPr lang="en-US" b="1" dirty="0" smtClean="0"/>
             </a:br>
             <a:r>
-              <a:rPr lang="en-US" dirty="0" smtClean="0"/>
+              <a:rPr lang="en-US" b="1" dirty="0" smtClean="0"/>
               <a:t>Alex Henry</a:t>
             </a:r>
           </a:p>
           <a:p>
             <a:r>
-              <a:rPr lang="en-US" dirty="0" smtClean="0"/>
+              <a:rPr lang="en-US" b="1" dirty="0" smtClean="0"/>
               <a:t>Robert </a:t>
             </a:r>
             <a:r>
-              <a:rPr lang="en-US" dirty="0" err="1" smtClean="0"/>
+              <a:rPr lang="en-US" b="1" dirty="0" err="1" smtClean="0"/>
               <a:t>Burrus</a:t>
             </a:r>
-            <a:endParaRPr lang="en-US" dirty="0"/>
+            <a:endParaRPr lang="en-US" b="1" dirty="0"/>
           </a:p>
         </p:txBody>
       </p:sp>
@@ -3894,31 +4407,31 @@
           </a:p>
           <a:p>
             <a:r>
-              <a:rPr lang="en-US" dirty="0"/>
+              <a:rPr lang="en-US" b="1" dirty="0"/>
               <a:t> </a:t>
             </a:r>
             <a:r>
-              <a:rPr lang="en-US" dirty="0" smtClean="0"/>
+              <a:rPr lang="en-US" b="1" dirty="0" smtClean="0"/>
               <a:t>There are a lot of buses and a lot of routes in Lexington.</a:t>
             </a:r>
           </a:p>
           <a:p>
             <a:r>
-              <a:rPr lang="en-US" dirty="0" smtClean="0"/>
+              <a:rPr lang="en-US" b="1" dirty="0" smtClean="0"/>
               <a:t>No easy way to find information on the buses and routes.</a:t>
             </a:r>
           </a:p>
           <a:p>
             <a:pPr lvl="1"/>
             <a:r>
-              <a:rPr lang="en-US" dirty="0" smtClean="0"/>
+              <a:rPr lang="en-US" b="1" dirty="0" smtClean="0"/>
               <a:t>Missed buses</a:t>
             </a:r>
           </a:p>
           <a:p>
             <a:pPr lvl="1"/>
             <a:r>
-              <a:rPr lang="en-US" dirty="0" smtClean="0"/>
+              <a:rPr lang="en-US" b="1" dirty="0" smtClean="0"/>
               <a:t>Missed opportunities to use public transportation.</a:t>
             </a:r>
           </a:p>
@@ -3993,36 +4506,36 @@
           <a:lstStyle/>
           <a:p>
             <a:r>
-              <a:rPr lang="en-US" dirty="0" smtClean="0"/>
+              <a:rPr lang="en-US" b="1" dirty="0" smtClean="0"/>
               <a:t>Create a Mobile App that allows users to…</a:t>
             </a:r>
           </a:p>
           <a:p>
             <a:pPr lvl="1"/>
             <a:r>
-              <a:rPr lang="en-US" dirty="0" smtClean="0"/>
+              <a:rPr lang="en-US" b="1" dirty="0" smtClean="0"/>
               <a:t>Get Route Information</a:t>
             </a:r>
           </a:p>
           <a:p>
             <a:pPr lvl="1"/>
             <a:r>
-              <a:rPr lang="en-US" dirty="0" smtClean="0"/>
+              <a:rPr lang="en-US" b="1" dirty="0" smtClean="0"/>
               <a:t>Get current bus locations</a:t>
             </a:r>
           </a:p>
           <a:p>
             <a:pPr lvl="1"/>
             <a:r>
-              <a:rPr lang="en-US" dirty="0" smtClean="0"/>
+              <a:rPr lang="en-US" b="1" dirty="0" smtClean="0"/>
               <a:t>Schedule Bus Stops so they don</a:t>
             </a:r>
             <a:r>
-              <a:rPr lang="fr-FR" dirty="0" smtClean="0"/>
+              <a:rPr lang="fr-FR" b="1" dirty="0" smtClean="0"/>
               <a:t>’</a:t>
             </a:r>
             <a:r>
-              <a:rPr lang="en-US" dirty="0" smtClean="0"/>
+              <a:rPr lang="en-US" b="1" dirty="0" smtClean="0"/>
               <a:t>t miss the bus</a:t>
             </a:r>
           </a:p>
@@ -4097,59 +4610,66 @@
           <a:lstStyle/>
           <a:p>
             <a:r>
-              <a:rPr lang="en-US" dirty="0" err="1" smtClean="0"/>
+              <a:rPr lang="en-US" b="1" dirty="0" err="1" smtClean="0"/>
               <a:t>Lextran</a:t>
             </a:r>
             <a:r>
-              <a:rPr lang="en-US" dirty="0" smtClean="0"/>
+              <a:rPr lang="en-US" b="1" dirty="0" smtClean="0"/>
               <a:t> API</a:t>
             </a:r>
           </a:p>
           <a:p>
             <a:pPr lvl="1"/>
             <a:r>
-              <a:rPr lang="en-US" dirty="0" smtClean="0"/>
+              <a:rPr lang="en-US" b="1" dirty="0" smtClean="0"/>
               <a:t>Route Maps</a:t>
             </a:r>
           </a:p>
           <a:p>
             <a:pPr lvl="1"/>
             <a:r>
-              <a:rPr lang="en-US" dirty="0" smtClean="0"/>
+              <a:rPr lang="en-US" b="1" dirty="0" smtClean="0"/>
               <a:t>Stop Locations</a:t>
             </a:r>
           </a:p>
           <a:p>
             <a:pPr lvl="1"/>
             <a:r>
-              <a:rPr lang="en-US" dirty="0" smtClean="0"/>
+              <a:rPr lang="en-US" b="1" dirty="0" smtClean="0"/>
               <a:t>Bus GPS tracking</a:t>
             </a:r>
           </a:p>
           <a:p>
             <a:r>
-              <a:rPr lang="en-US" dirty="0" smtClean="0"/>
+              <a:rPr lang="en-US" b="1" dirty="0" smtClean="0"/>
               <a:t>Eclipse</a:t>
             </a:r>
           </a:p>
           <a:p>
             <a:pPr lvl="1"/>
             <a:r>
-              <a:rPr lang="en-US" dirty="0" smtClean="0"/>
+              <a:rPr lang="en-US" b="1" dirty="0" smtClean="0"/>
               <a:t>Android </a:t>
             </a:r>
           </a:p>
           <a:p>
             <a:r>
-              <a:rPr lang="en-US" dirty="0" err="1" smtClean="0"/>
+              <a:rPr lang="en-US" b="1" dirty="0" smtClean="0"/>
+              <a:t>Google Maps V2 API</a:t>
+            </a:r>
+            <a:endParaRPr lang="en-US" b="1" dirty="0" smtClean="0"/>
+          </a:p>
+          <a:p>
+            <a:r>
+              <a:rPr lang="en-US" b="1" dirty="0" err="1" smtClean="0"/>
               <a:t>Xcode</a:t>
             </a:r>
-            <a:endParaRPr lang="en-US" dirty="0" smtClean="0"/>
+            <a:endParaRPr lang="en-US" b="1" dirty="0" smtClean="0"/>
           </a:p>
           <a:p>
             <a:pPr lvl="1"/>
             <a:r>
-              <a:rPr lang="en-US" dirty="0" smtClean="0"/>
+              <a:rPr lang="en-US" b="1" dirty="0" smtClean="0"/>
               <a:t>IOS 7</a:t>
             </a:r>
           </a:p>
@@ -4228,22 +4748,32 @@
           <a:lstStyle/>
           <a:p>
             <a:r>
-              <a:rPr lang="en-US" dirty="0" smtClean="0"/>
-              <a:t>User is shown a map with a route to select a stop from</a:t>
-            </a:r>
-          </a:p>
-          <a:p>
-            <a:r>
-              <a:rPr lang="en-US" dirty="0" smtClean="0"/>
-              <a:t>User can change the route</a:t>
-            </a:r>
-          </a:p>
-          <a:p>
-            <a:r>
-              <a:rPr lang="en-US" dirty="0" smtClean="0"/>
+              <a:rPr lang="en-US" b="1" dirty="0" smtClean="0"/>
+              <a:t>User is shown a map with a route to select a stop </a:t>
+            </a:r>
+            <a:r>
+              <a:rPr lang="en-US" b="1" dirty="0" smtClean="0"/>
+              <a:t>from</a:t>
+            </a:r>
+            <a:endParaRPr lang="en-US" b="1" dirty="0" smtClean="0"/>
+          </a:p>
+          <a:p>
+            <a:r>
+              <a:rPr lang="en-US" b="1" dirty="0" smtClean="0"/>
+              <a:t>User can change the </a:t>
+            </a:r>
+            <a:r>
+              <a:rPr lang="en-US" b="1" dirty="0" smtClean="0"/>
+              <a:t>route</a:t>
+            </a:r>
+            <a:endParaRPr lang="en-US" b="1" dirty="0" smtClean="0"/>
+          </a:p>
+          <a:p>
+            <a:r>
+              <a:rPr lang="en-US" b="1" dirty="0" smtClean="0"/>
               <a:t>User can set a notification for a bus stop</a:t>
             </a:r>
-            <a:endParaRPr lang="en-US" dirty="0"/>
+            <a:endParaRPr lang="en-US" b="1" dirty="0"/>
           </a:p>
         </p:txBody>
       </p:sp>
@@ -4406,53 +4936,53 @@
           <a:lstStyle/>
           <a:p>
             <a:r>
-              <a:rPr lang="en-US" dirty="0" err="1" smtClean="0"/>
+              <a:rPr lang="en-US" b="1" dirty="0" err="1" smtClean="0"/>
               <a:t>Lextran</a:t>
             </a:r>
             <a:r>
-              <a:rPr lang="en-US" dirty="0" smtClean="0"/>
+              <a:rPr lang="en-US" b="1" dirty="0" smtClean="0"/>
               <a:t> data was not clean.</a:t>
             </a:r>
           </a:p>
           <a:p>
             <a:pPr lvl="1"/>
             <a:r>
-              <a:rPr lang="en-US" dirty="0" smtClean="0"/>
+              <a:rPr lang="en-US" b="1" dirty="0" smtClean="0"/>
               <a:t>3 different types of KML</a:t>
             </a:r>
           </a:p>
           <a:p>
             <a:pPr lvl="1"/>
             <a:r>
-              <a:rPr lang="en-US" dirty="0" smtClean="0"/>
+              <a:rPr lang="en-US" b="1" dirty="0" smtClean="0"/>
               <a:t>Routes were not in order</a:t>
             </a:r>
           </a:p>
           <a:p>
             <a:pPr lvl="1"/>
             <a:r>
-              <a:rPr lang="en-US" dirty="0" smtClean="0"/>
+              <a:rPr lang="en-US" b="1" dirty="0" smtClean="0"/>
               <a:t>Routes were non-consecutive</a:t>
             </a:r>
           </a:p>
           <a:p>
             <a:r>
-              <a:rPr lang="en-US" dirty="0" err="1" smtClean="0"/>
+              <a:rPr lang="en-US" b="1" dirty="0" err="1" smtClean="0"/>
               <a:t>Lextran</a:t>
             </a:r>
             <a:r>
-              <a:rPr lang="en-US" dirty="0" smtClean="0"/>
+              <a:rPr lang="en-US" b="1" dirty="0" smtClean="0"/>
               <a:t> released an </a:t>
             </a:r>
             <a:r>
-              <a:rPr lang="en-US" dirty="0" err="1" smtClean="0"/>
+              <a:rPr lang="en-US" b="1" dirty="0" err="1" smtClean="0"/>
               <a:t>iOS</a:t>
             </a:r>
             <a:r>
-              <a:rPr lang="en-US" dirty="0" smtClean="0"/>
+              <a:rPr lang="en-US" b="1" dirty="0" smtClean="0"/>
               <a:t> beta app which has similar usage to our app.</a:t>
             </a:r>
-            <a:endParaRPr lang="en-US" dirty="0"/>
+            <a:endParaRPr lang="en-US" b="1" dirty="0"/>
           </a:p>
         </p:txBody>
       </p:sp>
@@ -4525,19 +5055,19 @@
           <a:lstStyle/>
           <a:p>
             <a:r>
-              <a:rPr lang="en-US" dirty="0" smtClean="0"/>
+              <a:rPr lang="en-US" b="1" dirty="0" smtClean="0"/>
               <a:t>Coordination is key</a:t>
             </a:r>
           </a:p>
           <a:p>
             <a:r>
-              <a:rPr lang="en-US" dirty="0" smtClean="0"/>
+              <a:rPr lang="en-US" b="1" dirty="0" smtClean="0"/>
               <a:t>The finalized design never looks like the original concept</a:t>
             </a:r>
           </a:p>
           <a:p>
             <a:r>
-              <a:rPr lang="en-US" dirty="0" smtClean="0"/>
+              <a:rPr lang="en-US" b="1" dirty="0" smtClean="0"/>
               <a:t>Important not to have chains of dependency</a:t>
             </a:r>
           </a:p>
@@ -4618,53 +5148,88 @@
 </file>
 
 <file path=ppt/theme/theme1.xml><?xml version="1.0" encoding="utf-8"?>
-<a:theme xmlns:a="http://schemas.openxmlformats.org/drawingml/2006/main" name="Office Theme">
+<a:theme xmlns:a="http://schemas.openxmlformats.org/drawingml/2006/main" name="NewsPrint">
   <a:themeElements>
-    <a:clrScheme name="Office">
+    <a:clrScheme name="NewsPrint">
       <a:dk1>
-        <a:sysClr val="windowText" lastClr="000000"/>
+        <a:sysClr val="windowText" lastClr="C0C0C0"/>
       </a:dk1>
       <a:lt1>
-        <a:sysClr val="window" lastClr="FFFFFF"/>
+        <a:sysClr val="window" lastClr="323232"/>
       </a:lt1>
       <a:dk2>
-        <a:srgbClr val="1F497D"/>
+        <a:srgbClr val="303030"/>
       </a:dk2>
       <a:lt2>
-        <a:srgbClr val="EEECE1"/>
+        <a:srgbClr val="DEDEE0"/>
       </a:lt2>
       <a:accent1>
-        <a:srgbClr val="4F81BD"/>
+        <a:srgbClr val="AD0101"/>
       </a:accent1>
       <a:accent2>
-        <a:srgbClr val="C0504D"/>
+        <a:srgbClr val="726056"/>
       </a:accent2>
       <a:accent3>
-        <a:srgbClr val="9BBB59"/>
+        <a:srgbClr val="AC956E"/>
       </a:accent3>
       <a:accent4>
-        <a:srgbClr val="8064A2"/>
+        <a:srgbClr val="808DA9"/>
       </a:accent4>
       <a:accent5>
-        <a:srgbClr val="4BACC6"/>
+        <a:srgbClr val="424E5B"/>
       </a:accent5>
       <a:accent6>
-        <a:srgbClr val="F79646"/>
+        <a:srgbClr val="730E00"/>
       </a:accent6>
       <a:hlink>
-        <a:srgbClr val="0000FF"/>
+        <a:srgbClr val="D26900"/>
       </a:hlink>
       <a:folHlink>
-        <a:srgbClr val="800080"/>
+        <a:srgbClr val="D89243"/>
       </a:folHlink>
     </a:clrScheme>
-    <a:fontScheme name="Office">
+    <a:fontScheme name="NewsPrint">
       <a:majorFont>
-        <a:latin typeface="Calibri"/>
+        <a:latin typeface="Impact"/>
         <a:ea typeface=""/>
         <a:cs typeface=""/>
-        <a:font script="Jpan" typeface="ＭＳ Ｐゴシック"/>
-        <a:font script="Hang" typeface="맑은 고딕"/>
+        <a:font script="Jpan" typeface="HGP創英角ｺﾞｼｯｸUB"/>
+        <a:font script="Hang" typeface="HY견고딕"/>
+        <a:font script="Hans" typeface="微软雅黑"/>
+        <a:font script="Hant" typeface="微軟正黑體"/>
+        <a:font script="Arab" typeface="Tahoma"/>
+        <a:font script="Hebr" typeface="Tohoma"/>
+        <a:font script="Thai" typeface="Tahoma"/>
+        <a:font script="Ethi" typeface="Nyala"/>
+        <a:font script="Beng" typeface="Vrinda"/>
+        <a:font script="Gujr" typeface="Shruti"/>
+        <a:font script="Khmr" typeface="MoolBoran"/>
+        <a:font script="Knda" typeface="Tunga"/>
+        <a:font script="Guru" typeface="Raavi"/>
+        <a:font script="Cans" typeface="Euphemia"/>
+        <a:font script="Cher" typeface="Plantagenet Cherokee"/>
+        <a:font script="Yiii" typeface="Microsoft Yi Baiti"/>
+        <a:font script="Tibt" typeface="Microsoft Himalaya"/>
+        <a:font script="Thaa" typeface="MV Boli"/>
+        <a:font script="Deva" typeface="Mangal"/>
+        <a:font script="Telu" typeface="Gautami"/>
+        <a:font script="Taml" typeface="Latha"/>
+        <a:font script="Syrc" typeface="Estrangelo Edessa"/>
+        <a:font script="Orya" typeface="Kalinga"/>
+        <a:font script="Mlym" typeface="Kartika"/>
+        <a:font script="Laoo" typeface="DokChampa"/>
+        <a:font script="Sinh" typeface="Iskoola Pota"/>
+        <a:font script="Mong" typeface="Mongolian Baiti"/>
+        <a:font script="Viet" typeface="Times New Roman"/>
+        <a:font script="Uigh" typeface="Microsoft Uighur"/>
+        <a:font script="Geor" typeface="Sylfaen"/>
+      </a:majorFont>
+      <a:minorFont>
+        <a:latin typeface="Times New Roman"/>
+        <a:ea typeface=""/>
+        <a:cs typeface=""/>
+        <a:font script="Jpan" typeface="ＭＳ Ｐ明朝"/>
+        <a:font script="Hang" typeface="바탕"/>
         <a:font script="Hans" typeface="宋体"/>
         <a:font script="Hant" typeface="新細明體"/>
         <a:font script="Arab" typeface="Times New Roman"/>
@@ -4693,44 +5258,9 @@
         <a:font script="Viet" typeface="Times New Roman"/>
         <a:font script="Uigh" typeface="Microsoft Uighur"/>
         <a:font script="Geor" typeface="Sylfaen"/>
-      </a:majorFont>
-      <a:minorFont>
-        <a:latin typeface="Calibri"/>
-        <a:ea typeface=""/>
-        <a:cs typeface=""/>
-        <a:font script="Jpan" typeface="ＭＳ Ｐゴシック"/>
-        <a:font script="Hang" typeface="맑은 고딕"/>
-        <a:font script="Hans" typeface="宋体"/>
-        <a:font script="Hant" typeface="新細明體"/>
-        <a:font script="Arab" typeface="Arial"/>
-        <a:font script="Hebr" typeface="Arial"/>
-        <a:font script="Thai" typeface="Cordia New"/>
-        <a:font script="Ethi" typeface="Nyala"/>
-        <a:font script="Beng" typeface="Vrinda"/>
-        <a:font script="Gujr" typeface="Shruti"/>
-        <a:font script="Khmr" typeface="DaunPenh"/>
-        <a:font script="Knda" typeface="Tunga"/>
-        <a:font script="Guru" typeface="Raavi"/>
-        <a:font script="Cans" typeface="Euphemia"/>
-        <a:font script="Cher" typeface="Plantagenet Cherokee"/>
-        <a:font script="Yiii" typeface="Microsoft Yi Baiti"/>
-        <a:font script="Tibt" typeface="Microsoft Himalaya"/>
-        <a:font script="Thaa" typeface="MV Boli"/>
-        <a:font script="Deva" typeface="Mangal"/>
-        <a:font script="Telu" typeface="Gautami"/>
-        <a:font script="Taml" typeface="Latha"/>
-        <a:font script="Syrc" typeface="Estrangelo Edessa"/>
-        <a:font script="Orya" typeface="Kalinga"/>
-        <a:font script="Mlym" typeface="Kartika"/>
-        <a:font script="Laoo" typeface="DokChampa"/>
-        <a:font script="Sinh" typeface="Iskoola Pota"/>
-        <a:font script="Mong" typeface="Mongolian Baiti"/>
-        <a:font script="Viet" typeface="Arial"/>
-        <a:font script="Uigh" typeface="Microsoft Uighur"/>
-        <a:font script="Geor" typeface="Sylfaen"/>
       </a:minorFont>
     </a:fontScheme>
-    <a:fmtScheme name="Office">
+    <a:fmtScheme name="NewsPrint">
       <a:fillStyleLst>
         <a:solidFill>
           <a:schemeClr val="phClr"/>
@@ -4739,62 +5269,69 @@
           <a:gsLst>
             <a:gs pos="0">
               <a:schemeClr val="phClr">
-                <a:tint val="50000"/>
-                <a:satMod val="300000"/>
-              </a:schemeClr>
-            </a:gs>
-            <a:gs pos="35000">
-              <a:schemeClr val="phClr">
                 <a:tint val="37000"/>
-                <a:satMod val="300000"/>
+                <a:hueMod val="100000"/>
+                <a:satMod val="200000"/>
+                <a:lumMod val="88000"/>
               </a:schemeClr>
             </a:gs>
             <a:gs pos="100000">
               <a:schemeClr val="phClr">
-                <a:tint val="15000"/>
+                <a:tint val="53000"/>
+                <a:shade val="100000"/>
+                <a:hueMod val="100000"/>
                 <a:satMod val="350000"/>
+                <a:lumMod val="79000"/>
               </a:schemeClr>
             </a:gs>
           </a:gsLst>
-          <a:lin ang="16200000" scaled="1"/>
+          <a:lin ang="5400000" scaled="1"/>
         </a:gradFill>
         <a:gradFill rotWithShape="1">
           <a:gsLst>
             <a:gs pos="0">
               <a:schemeClr val="phClr">
-                <a:tint val="100000"/>
+                <a:tint val="83000"/>
                 <a:shade val="100000"/>
-                <a:satMod val="130000"/>
+                <a:alpha val="100000"/>
+                <a:hueMod val="100000"/>
+                <a:satMod val="220000"/>
+                <a:lumMod val="90000"/>
+              </a:schemeClr>
+            </a:gs>
+            <a:gs pos="76000">
+              <a:schemeClr val="phClr">
+                <a:shade val="100000"/>
               </a:schemeClr>
             </a:gs>
             <a:gs pos="100000">
               <a:schemeClr val="phClr">
-                <a:tint val="50000"/>
-                <a:shade val="100000"/>
-                <a:satMod val="350000"/>
+                <a:shade val="93000"/>
+                <a:alpha val="100000"/>
+                <a:satMod val="100000"/>
+                <a:lumMod val="93000"/>
               </a:schemeClr>
             </a:gs>
           </a:gsLst>
-          <a:lin ang="16200000" scaled="0"/>
+          <a:path path="circle">
+            <a:fillToRect l="15000" t="15000" r="100000" b="100000"/>
+          </a:path>
         </a:gradFill>
       </a:fillStyleLst>
       <a:lnStyleLst>
-        <a:ln w="9525" cap="flat" cmpd="sng" algn="ctr">
-          <a:solidFill>
-            <a:schemeClr val="phClr">
-              <a:shade val="95000"/>
-              <a:satMod val="105000"/>
-            </a:schemeClr>
-          </a:solidFill>
-          <a:prstDash val="solid"/>
-        </a:ln>
-        <a:ln w="25400" cap="flat" cmpd="sng" algn="ctr">
+        <a:ln w="15875" cap="flat" cmpd="sng" algn="ctr">
           <a:solidFill>
             <a:schemeClr val="phClr"/>
           </a:solidFill>
           <a:prstDash val="solid"/>
         </a:ln>
-        <a:ln w="38100" cap="flat" cmpd="sng" algn="ctr">
+        <a:ln w="22225" cap="flat" cmpd="sng" algn="ctr">
+          <a:solidFill>
+            <a:schemeClr val="phClr"/>
+          </a:solidFill>
+          <a:prstDash val="solid"/>
+        </a:ln>
+        <a:ln w="34925" cap="flat" cmpd="sng" algn="ctr">
           <a:solidFill>
             <a:schemeClr val="phClr"/>
           </a:solidFill>
@@ -4804,16 +5341,16 @@
       <a:effectStyleLst>
         <a:effectStyle>
           <a:effectLst>
-            <a:outerShdw blurRad="40000" dist="20000" dir="5400000" rotWithShape="0">
+            <a:outerShdw blurRad="50800" dist="12700" dir="5280000" rotWithShape="0">
               <a:srgbClr val="000000">
-                <a:alpha val="38000"/>
+                <a:alpha val="40000"/>
               </a:srgbClr>
             </a:outerShdw>
           </a:effectLst>
         </a:effectStyle>
         <a:effectStyle>
           <a:effectLst>
-            <a:outerShdw blurRad="40000" dist="23000" dir="5400000" rotWithShape="0">
+            <a:outerShdw blurRad="38100" dist="38100" dir="5400000" rotWithShape="0">
               <a:srgbClr val="000000">
                 <a:alpha val="35000"/>
               </a:srgbClr>
@@ -4822,7 +5359,7 @@
         </a:effectStyle>
         <a:effectStyle>
           <a:effectLst>
-            <a:outerShdw blurRad="40000" dist="23000" dir="5400000" rotWithShape="0">
+            <a:outerShdw blurRad="38100" dist="38100" dir="5400000" rotWithShape="0">
               <a:srgbClr val="000000">
                 <a:alpha val="35000"/>
               </a:srgbClr>
@@ -4832,12 +5369,13 @@
             <a:camera prst="orthographicFront">
               <a:rot lat="0" lon="0" rev="0"/>
             </a:camera>
-            <a:lightRig rig="threePt" dir="t">
-              <a:rot lat="0" lon="0" rev="1200000"/>
-            </a:lightRig>
+            <a:lightRig rig="brightRoom" dir="tl"/>
           </a:scene3d>
-          <a:sp3d>
-            <a:bevelT w="63500" h="25400"/>
+          <a:sp3d contourW="12700">
+            <a:bevelT w="31750" h="12700"/>
+            <a:contourClr>
+              <a:schemeClr val="phClr"/>
+            </a:contourClr>
           </a:sp3d>
         </a:effectStyle>
       </a:effectStyleLst>
@@ -4849,90 +5387,37 @@
           <a:gsLst>
             <a:gs pos="0">
               <a:schemeClr val="phClr">
-                <a:tint val="40000"/>
-                <a:satMod val="350000"/>
-              </a:schemeClr>
-            </a:gs>
-            <a:gs pos="40000">
-              <a:schemeClr val="phClr">
-                <a:tint val="45000"/>
-                <a:shade val="99000"/>
-                <a:satMod val="350000"/>
+                <a:tint val="93000"/>
               </a:schemeClr>
             </a:gs>
             <a:gs pos="100000">
               <a:schemeClr val="phClr">
-                <a:shade val="20000"/>
-                <a:satMod val="255000"/>
+                <a:shade val="55000"/>
               </a:schemeClr>
             </a:gs>
           </a:gsLst>
-          <a:path path="circle">
-            <a:fillToRect l="50000" t="-80000" r="50000" b="180000"/>
-          </a:path>
+          <a:lin ang="5400000" scaled="1"/>
         </a:gradFill>
-        <a:gradFill rotWithShape="1">
-          <a:gsLst>
-            <a:gs pos="0">
+        <a:blipFill rotWithShape="1">
+          <a:blip xmlns:r="http://schemas.openxmlformats.org/officeDocument/2006/relationships" r:embed="rId1">
+            <a:duotone>
               <a:schemeClr val="phClr">
-                <a:tint val="80000"/>
-                <a:satMod val="300000"/>
+                <a:shade val="20000"/>
+                <a:satMod val="350000"/>
+                <a:lumMod val="125000"/>
               </a:schemeClr>
-            </a:gs>
-            <a:gs pos="100000">
               <a:schemeClr val="phClr">
-                <a:shade val="30000"/>
-                <a:satMod val="200000"/>
+                <a:tint val="90000"/>
+                <a:satMod val="250000"/>
               </a:schemeClr>
-            </a:gs>
-          </a:gsLst>
-          <a:path path="circle">
-            <a:fillToRect l="50000" t="50000" r="50000" b="50000"/>
-          </a:path>
-        </a:gradFill>
+            </a:duotone>
+          </a:blip>
+          <a:stretch/>
+        </a:blipFill>
       </a:bgFillStyleLst>
     </a:fmtScheme>
   </a:themeElements>
-  <a:objectDefaults>
-    <a:spDef>
-      <a:spPr/>
-      <a:bodyPr/>
-      <a:lstStyle/>
-      <a:style>
-        <a:lnRef idx="1">
-          <a:schemeClr val="accent1"/>
-        </a:lnRef>
-        <a:fillRef idx="3">
-          <a:schemeClr val="accent1"/>
-        </a:fillRef>
-        <a:effectRef idx="2">
-          <a:schemeClr val="accent1"/>
-        </a:effectRef>
-        <a:fontRef idx="minor">
-          <a:schemeClr val="lt1"/>
-        </a:fontRef>
-      </a:style>
-    </a:spDef>
-    <a:lnDef>
-      <a:spPr/>
-      <a:bodyPr/>
-      <a:lstStyle/>
-      <a:style>
-        <a:lnRef idx="2">
-          <a:schemeClr val="accent1"/>
-        </a:lnRef>
-        <a:fillRef idx="0">
-          <a:schemeClr val="accent1"/>
-        </a:fillRef>
-        <a:effectRef idx="1">
-          <a:schemeClr val="accent1"/>
-        </a:effectRef>
-        <a:fontRef idx="minor">
-          <a:schemeClr val="tx1"/>
-        </a:fontRef>
-      </a:style>
-    </a:lnDef>
-  </a:objectDefaults>
+  <a:objectDefaults/>
   <a:extraClrSchemeLst/>
 </a:theme>
 </file>
@@ -4942,10 +5427,10 @@
   <a:themeElements>
     <a:clrScheme name="Office">
       <a:dk1>
-        <a:sysClr val="windowText" lastClr="000000"/>
+        <a:sysClr val="windowText" lastClr="C0C0C0"/>
       </a:dk1>
       <a:lt1>
-        <a:sysClr val="window" lastClr="FFFFFF"/>
+        <a:sysClr val="window" lastClr="323232"/>
       </a:lt1>
       <a:dk2>
         <a:srgbClr val="1F497D"/>

</xml_diff>

<commit_message>
added discontinued iOS app
</commit_message>
<xml_diff>
--- a/Presentation1.pptx
+++ b/Presentation1.pptx
@@ -225,7 +225,7 @@
           <a:p>
             <a:fld id="{0F8BB444-EF59-AF47-AE8C-C0DA026BC7F8}" type="datetimeFigureOut">
               <a:rPr lang="en-US" smtClean="0"/>
-              <a:t>4/25/2014</a:t>
+              <a:t>4/28/14</a:t>
             </a:fld>
             <a:endParaRPr lang="en-US"/>
           </a:p>
@@ -815,7 +815,7 @@
           <a:p>
             <a:fld id="{4AD26688-83F8-AC4D-BBFC-F74327B9A175}" type="datetimeFigureOut">
               <a:rPr lang="en-US" smtClean="0"/>
-              <a:t>4/25/2014</a:t>
+              <a:t>4/28/14</a:t>
             </a:fld>
             <a:endParaRPr lang="en-US"/>
           </a:p>
@@ -914,7 +914,7 @@
   <p:timing>
     <p:tnLst>
       <p:par>
-        <p:cTn id="1" dur="indefinite" restart="never" nodeType="tmRoot"/>
+        <p:cTn xmlns:p14="http://schemas.microsoft.com/office/powerpoint/2010/main" id="1" dur="indefinite" restart="never" nodeType="tmRoot"/>
       </p:par>
     </p:tnLst>
   </p:timing>
@@ -1035,7 +1035,7 @@
           <a:p>
             <a:fld id="{4AD26688-83F8-AC4D-BBFC-F74327B9A175}" type="datetimeFigureOut">
               <a:rPr lang="en-US" smtClean="0"/>
-              <a:t>4/25/2014</a:t>
+              <a:t>4/28/14</a:t>
             </a:fld>
             <a:endParaRPr lang="en-US"/>
           </a:p>
@@ -1091,7 +1091,7 @@
   <p:timing>
     <p:tnLst>
       <p:par>
-        <p:cTn id="1" dur="indefinite" restart="never" nodeType="tmRoot"/>
+        <p:cTn xmlns:p14="http://schemas.microsoft.com/office/powerpoint/2010/main" id="1" dur="indefinite" restart="never" nodeType="tmRoot"/>
       </p:par>
     </p:tnLst>
   </p:timing>
@@ -1217,7 +1217,7 @@
           <a:p>
             <a:fld id="{4AD26688-83F8-AC4D-BBFC-F74327B9A175}" type="datetimeFigureOut">
               <a:rPr lang="en-US" smtClean="0"/>
-              <a:t>4/25/2014</a:t>
+              <a:t>4/28/14</a:t>
             </a:fld>
             <a:endParaRPr lang="en-US"/>
           </a:p>
@@ -1273,7 +1273,7 @@
   <p:timing>
     <p:tnLst>
       <p:par>
-        <p:cTn id="1" dur="indefinite" restart="never" nodeType="tmRoot"/>
+        <p:cTn xmlns:p14="http://schemas.microsoft.com/office/powerpoint/2010/main" id="1" dur="indefinite" restart="never" nodeType="tmRoot"/>
       </p:par>
     </p:tnLst>
   </p:timing>
@@ -1389,7 +1389,7 @@
           <a:p>
             <a:fld id="{4AD26688-83F8-AC4D-BBFC-F74327B9A175}" type="datetimeFigureOut">
               <a:rPr lang="en-US" smtClean="0"/>
-              <a:t>4/25/2014</a:t>
+              <a:t>4/28/14</a:t>
             </a:fld>
             <a:endParaRPr lang="en-US"/>
           </a:p>
@@ -1445,7 +1445,7 @@
   <p:timing>
     <p:tnLst>
       <p:par>
-        <p:cTn id="1" dur="indefinite" restart="never" nodeType="tmRoot"/>
+        <p:cTn xmlns:p14="http://schemas.microsoft.com/office/powerpoint/2010/main" id="1" dur="indefinite" restart="never" nodeType="tmRoot"/>
       </p:par>
     </p:tnLst>
   </p:timing>
@@ -1680,7 +1680,7 @@
           <a:p>
             <a:fld id="{4AD26688-83F8-AC4D-BBFC-F74327B9A175}" type="datetimeFigureOut">
               <a:rPr lang="en-US" smtClean="0"/>
-              <a:t>4/25/2014</a:t>
+              <a:t>4/28/14</a:t>
             </a:fld>
             <a:endParaRPr lang="en-US"/>
           </a:p>
@@ -1779,7 +1779,7 @@
   <p:timing>
     <p:tnLst>
       <p:par>
-        <p:cTn id="1" dur="indefinite" restart="never" nodeType="tmRoot"/>
+        <p:cTn xmlns:p14="http://schemas.microsoft.com/office/powerpoint/2010/main" id="1" dur="indefinite" restart="never" nodeType="tmRoot"/>
       </p:par>
     </p:tnLst>
   </p:timing>
@@ -2013,7 +2013,7 @@
           <a:p>
             <a:fld id="{4AD26688-83F8-AC4D-BBFC-F74327B9A175}" type="datetimeFigureOut">
               <a:rPr lang="en-US" smtClean="0"/>
-              <a:t>4/25/2014</a:t>
+              <a:t>4/28/14</a:t>
             </a:fld>
             <a:endParaRPr lang="en-US"/>
           </a:p>
@@ -2069,7 +2069,7 @@
   <p:timing>
     <p:tnLst>
       <p:par>
-        <p:cTn id="1" dur="indefinite" restart="never" nodeType="tmRoot"/>
+        <p:cTn xmlns:p14="http://schemas.microsoft.com/office/powerpoint/2010/main" id="1" dur="indefinite" restart="never" nodeType="tmRoot"/>
       </p:par>
     </p:tnLst>
   </p:timing>
@@ -2445,7 +2445,7 @@
           <a:p>
             <a:fld id="{4AD26688-83F8-AC4D-BBFC-F74327B9A175}" type="datetimeFigureOut">
               <a:rPr lang="en-US" smtClean="0"/>
-              <a:t>4/25/2014</a:t>
+              <a:t>4/28/14</a:t>
             </a:fld>
             <a:endParaRPr lang="en-US"/>
           </a:p>
@@ -2561,7 +2561,7 @@
   <p:timing>
     <p:tnLst>
       <p:par>
-        <p:cTn id="1" dur="indefinite" restart="never" nodeType="tmRoot"/>
+        <p:cTn xmlns:p14="http://schemas.microsoft.com/office/powerpoint/2010/main" id="1" dur="indefinite" restart="never" nodeType="tmRoot"/>
       </p:par>
     </p:tnLst>
   </p:timing>
@@ -2625,7 +2625,7 @@
           <a:p>
             <a:fld id="{4AD26688-83F8-AC4D-BBFC-F74327B9A175}" type="datetimeFigureOut">
               <a:rPr lang="en-US" smtClean="0"/>
-              <a:t>4/25/2014</a:t>
+              <a:t>4/28/14</a:t>
             </a:fld>
             <a:endParaRPr lang="en-US"/>
           </a:p>
@@ -2681,7 +2681,7 @@
   <p:timing>
     <p:tnLst>
       <p:par>
-        <p:cTn id="1" dur="indefinite" restart="never" nodeType="tmRoot"/>
+        <p:cTn xmlns:p14="http://schemas.microsoft.com/office/powerpoint/2010/main" id="1" dur="indefinite" restart="never" nodeType="tmRoot"/>
       </p:par>
     </p:tnLst>
   </p:timing>
@@ -2722,7 +2722,7 @@
           <a:p>
             <a:fld id="{4AD26688-83F8-AC4D-BBFC-F74327B9A175}" type="datetimeFigureOut">
               <a:rPr lang="en-US" smtClean="0"/>
-              <a:t>4/25/2014</a:t>
+              <a:t>4/28/14</a:t>
             </a:fld>
             <a:endParaRPr lang="en-US"/>
           </a:p>
@@ -2778,7 +2778,7 @@
   <p:timing>
     <p:tnLst>
       <p:par>
-        <p:cTn id="1" dur="indefinite" restart="never" nodeType="tmRoot"/>
+        <p:cTn xmlns:p14="http://schemas.microsoft.com/office/powerpoint/2010/main" id="1" dur="indefinite" restart="never" nodeType="tmRoot"/>
       </p:par>
     </p:tnLst>
   </p:timing>
@@ -3009,7 +3009,7 @@
           <a:p>
             <a:fld id="{4AD26688-83F8-AC4D-BBFC-F74327B9A175}" type="datetimeFigureOut">
               <a:rPr lang="en-US" smtClean="0"/>
-              <a:t>4/25/2014</a:t>
+              <a:t>4/28/14</a:t>
             </a:fld>
             <a:endParaRPr lang="en-US"/>
           </a:p>
@@ -3103,7 +3103,7 @@
   <p:timing>
     <p:tnLst>
       <p:par>
-        <p:cTn id="1" dur="indefinite" restart="never" nodeType="tmRoot"/>
+        <p:cTn xmlns:p14="http://schemas.microsoft.com/office/powerpoint/2010/main" id="1" dur="indefinite" restart="never" nodeType="tmRoot"/>
       </p:par>
     </p:tnLst>
   </p:timing>
@@ -3315,7 +3315,7 @@
           <a:p>
             <a:fld id="{4AD26688-83F8-AC4D-BBFC-F74327B9A175}" type="datetimeFigureOut">
               <a:rPr lang="en-US" smtClean="0"/>
-              <a:t>4/25/2014</a:t>
+              <a:t>4/28/14</a:t>
             </a:fld>
             <a:endParaRPr lang="en-US"/>
           </a:p>
@@ -3371,7 +3371,7 @@
   <p:timing>
     <p:tnLst>
       <p:par>
-        <p:cTn id="1" dur="indefinite" restart="never" nodeType="tmRoot"/>
+        <p:cTn xmlns:p14="http://schemas.microsoft.com/office/powerpoint/2010/main" id="1" dur="indefinite" restart="never" nodeType="tmRoot"/>
       </p:par>
     </p:tnLst>
   </p:timing>
@@ -3532,7 +3532,7 @@
           <a:p>
             <a:fld id="{4AD26688-83F8-AC4D-BBFC-F74327B9A175}" type="datetimeFigureOut">
               <a:rPr lang="en-US" smtClean="0"/>
-              <a:t>4/25/2014</a:t>
+              <a:t>4/28/14</a:t>
             </a:fld>
             <a:endParaRPr lang="en-US"/>
           </a:p>
@@ -3724,7 +3724,7 @@
   <p:timing>
     <p:tnLst>
       <p:par>
-        <p:cTn id="1" dur="indefinite" restart="never" nodeType="tmRoot"/>
+        <p:cTn xmlns:p14="http://schemas.microsoft.com/office/powerpoint/2010/main" id="1" dur="indefinite" restart="never" nodeType="tmRoot"/>
       </p:par>
     </p:tnLst>
   </p:timing>
@@ -4809,7 +4809,7 @@
           </a:prstGeom>
           <a:noFill/>
           <a:extLst>
-            <a:ext uri="{909E8E84-426E-40DD-AFC4-6F175D3DCCD1}">
+            <a:ext uri="{909E8E84-426E-40dd-AFC4-6F175D3DCCD1}">
               <a14:hiddenFill xmlns:a14="http://schemas.microsoft.com/office/drawing/2010/main">
                 <a:solidFill>
                   <a:srgbClr val="FFFFFF"/>
@@ -4866,11 +4866,7 @@
           <a:p>
             <a:r>
               <a:rPr lang="en-US" b="1" dirty="0" smtClean="0"/>
-              <a:t>Create a Mobile App that allows users to</a:t>
-            </a:r>
-            <a:r>
-              <a:rPr lang="en-US" b="1" dirty="0" smtClean="0"/>
-              <a:t>…</a:t>
+              <a:t>Create a Mobile App that allows users to…</a:t>
             </a:r>
           </a:p>
           <a:p>
@@ -4883,35 +4879,21 @@
             <a:pPr lvl="1"/>
             <a:r>
               <a:rPr lang="en-US" b="1" dirty="0" smtClean="0"/>
-              <a:t>Get Route </a:t>
-            </a:r>
+              <a:t>Get Route Information</a:t>
+            </a:r>
+          </a:p>
+          <a:p>
+            <a:pPr lvl="1"/>
             <a:r>
               <a:rPr lang="en-US" b="1" dirty="0" smtClean="0"/>
-              <a:t>Information</a:t>
-            </a:r>
-            <a:endParaRPr lang="en-US" b="1" dirty="0" smtClean="0"/>
+              <a:t>Get current bus locations</a:t>
+            </a:r>
           </a:p>
           <a:p>
             <a:pPr lvl="1"/>
             <a:r>
               <a:rPr lang="en-US" b="1" dirty="0" smtClean="0"/>
-              <a:t>Get current bus </a:t>
-            </a:r>
-            <a:r>
-              <a:rPr lang="en-US" b="1" dirty="0" smtClean="0"/>
-              <a:t>locations</a:t>
-            </a:r>
-            <a:endParaRPr lang="en-US" b="1" dirty="0" smtClean="0"/>
-          </a:p>
-          <a:p>
-            <a:pPr lvl="1"/>
-            <a:r>
-              <a:rPr lang="en-US" b="1" dirty="0" smtClean="0"/>
-              <a:t>Schedule Bus Stops </a:t>
-            </a:r>
-            <a:r>
-              <a:rPr lang="en-US" b="1" dirty="0" smtClean="0"/>
-              <a:t>so</a:t>
+              <a:t>Schedule Bus Stops so</a:t>
             </a:r>
           </a:p>
           <a:p>
@@ -4924,11 +4906,7 @@
             </a:r>
             <a:r>
               <a:rPr lang="en-US" b="1" dirty="0" smtClean="0"/>
-              <a:t>they </a:t>
-            </a:r>
-            <a:r>
-              <a:rPr lang="en-US" b="1" dirty="0" smtClean="0"/>
-              <a:t>don</a:t>
+              <a:t>they don</a:t>
             </a:r>
             <a:r>
               <a:rPr lang="fr-FR" b="1" dirty="0" smtClean="0"/>
@@ -5109,7 +5087,7 @@
           </a:prstGeom>
           <a:noFill/>
           <a:extLst>
-            <a:ext uri="{909E8E84-426E-40DD-AFC4-6F175D3DCCD1}">
+            <a:ext uri="{909E8E84-426E-40dd-AFC4-6F175D3DCCD1}">
               <a14:hiddenFill xmlns:a14="http://schemas.microsoft.com/office/drawing/2010/main">
                 <a:solidFill>
                   <a:srgbClr val="FFFFFF"/>
@@ -5196,24 +5174,16 @@
           <a:p>
             <a:r>
               <a:rPr lang="en-US" b="1" dirty="0" smtClean="0"/>
-              <a:t>User is shown a map with a route to select a stop </a:t>
-            </a:r>
+              <a:t>User is shown a map with a route to select a stop from</a:t>
+            </a:r>
+          </a:p>
+          <a:p>
+            <a:endParaRPr lang="en-US" b="1" dirty="0" smtClean="0"/>
+          </a:p>
+          <a:p>
             <a:r>
               <a:rPr lang="en-US" b="1" dirty="0" smtClean="0"/>
-              <a:t>from</a:t>
-            </a:r>
-          </a:p>
-          <a:p>
-            <a:endParaRPr lang="en-US" b="1" dirty="0" smtClean="0"/>
-          </a:p>
-          <a:p>
-            <a:r>
-              <a:rPr lang="en-US" b="1" dirty="0" smtClean="0"/>
-              <a:t>User can change the </a:t>
-            </a:r>
-            <a:r>
-              <a:rPr lang="en-US" b="1" dirty="0" smtClean="0"/>
-              <a:t>route</a:t>
+              <a:t>User can change the route</a:t>
             </a:r>
           </a:p>
           <a:p>
@@ -5259,7 +5229,7 @@
           </a:prstGeom>
           <a:noFill/>
           <a:extLst>
-            <a:ext uri="{909E8E84-426E-40DD-AFC4-6F175D3DCCD1}">
+            <a:ext uri="{909E8E84-426E-40dd-AFC4-6F175D3DCCD1}">
               <a14:hiddenFill xmlns:a14="http://schemas.microsoft.com/office/drawing/2010/main">
                 <a:solidFill>
                   <a:srgbClr val="FFFFFF"/>
@@ -5454,11 +5424,7 @@
             <a:pPr lvl="1"/>
             <a:r>
               <a:rPr lang="en-US" b="1" dirty="0" smtClean="0"/>
-              <a:t>Routes were </a:t>
-            </a:r>
-            <a:r>
-              <a:rPr lang="en-US" b="1" dirty="0" smtClean="0"/>
-              <a:t>non-consecutive</a:t>
+              <a:t>Routes were non-consecutive</a:t>
             </a:r>
           </a:p>
           <a:p>
@@ -5480,7 +5446,26 @@
             </a:r>
             <a:r>
               <a:rPr lang="en-US" b="1" dirty="0" smtClean="0"/>
-              <a:t> beta app which has similar usage to our app.</a:t>
+              <a:t> beta app which has similar usage to our app</a:t>
+            </a:r>
+            <a:r>
+              <a:rPr lang="en-US" b="1" dirty="0" smtClean="0"/>
+              <a:t>.</a:t>
+            </a:r>
+          </a:p>
+          <a:p>
+            <a:pPr lvl="1"/>
+            <a:r>
+              <a:rPr lang="en-US" b="1" dirty="0" smtClean="0"/>
+              <a:t>Discontinued the </a:t>
+            </a:r>
+            <a:r>
+              <a:rPr lang="en-US" b="1" dirty="0" err="1" smtClean="0"/>
+              <a:t>iOS</a:t>
+            </a:r>
+            <a:r>
+              <a:rPr lang="en-US" b="1" dirty="0" smtClean="0"/>
+              <a:t> app</a:t>
             </a:r>
             <a:endParaRPr lang="en-US" b="1" dirty="0"/>
           </a:p>
@@ -5556,24 +5541,16 @@
           <a:p>
             <a:r>
               <a:rPr lang="en-US" b="1" dirty="0" smtClean="0"/>
-              <a:t>Coordination is </a:t>
-            </a:r>
+              <a:t>Coordination is key</a:t>
+            </a:r>
+          </a:p>
+          <a:p>
+            <a:endParaRPr lang="en-US" b="1" dirty="0" smtClean="0"/>
+          </a:p>
+          <a:p>
             <a:r>
               <a:rPr lang="en-US" b="1" dirty="0" smtClean="0"/>
-              <a:t>key</a:t>
-            </a:r>
-          </a:p>
-          <a:p>
-            <a:endParaRPr lang="en-US" b="1" dirty="0" smtClean="0"/>
-          </a:p>
-          <a:p>
-            <a:r>
-              <a:rPr lang="en-US" b="1" dirty="0" smtClean="0"/>
-              <a:t>The finalized design never looks like the original </a:t>
-            </a:r>
-            <a:r>
-              <a:rPr lang="en-US" b="1" dirty="0" smtClean="0"/>
-              <a:t>concept</a:t>
+              <a:t>The finalized design never looks like the original concept</a:t>
             </a:r>
           </a:p>
           <a:p>
@@ -5621,7 +5598,7 @@
           </a:prstGeom>
           <a:noFill/>
           <a:extLst>
-            <a:ext uri="{909E8E84-426E-40DD-AFC4-6F175D3DCCD1}">
+            <a:ext uri="{909E8E84-426E-40dd-AFC4-6F175D3DCCD1}">
               <a14:hiddenFill xmlns:a14="http://schemas.microsoft.com/office/drawing/2010/main">
                 <a:solidFill>
                   <a:srgbClr val="FFFFFF"/>
@@ -5961,10 +5938,10 @@
   <a:themeElements>
     <a:clrScheme name="NewsPrint">
       <a:dk1>
-        <a:sysClr val="windowText" lastClr="C0C0C0"/>
+        <a:sysClr val="windowText" lastClr="000000"/>
       </a:dk1>
       <a:lt1>
-        <a:sysClr val="window" lastClr="1F1F1F"/>
+        <a:sysClr val="window" lastClr="FFFFFF"/>
       </a:lt1>
       <a:dk2>
         <a:srgbClr val="303030"/>
@@ -6236,10 +6213,10 @@
   <a:themeElements>
     <a:clrScheme name="Office">
       <a:dk1>
-        <a:sysClr val="windowText" lastClr="C0C0C0"/>
+        <a:sysClr val="windowText" lastClr="000000"/>
       </a:dk1>
       <a:lt1>
-        <a:sysClr val="window" lastClr="1F1F1F"/>
+        <a:sysClr val="window" lastClr="FFFFFF"/>
       </a:lt1>
       <a:dk2>
         <a:srgbClr val="1F497D"/>

</xml_diff>